<commit_message>
modificações Apresentação + pdf
</commit_message>
<xml_diff>
--- a/ApresentacaoMN.pptx
+++ b/ApresentacaoMN.pptx
@@ -11,11 +11,14 @@
     <p:sldId id="264" r:id="rId5"/>
     <p:sldId id="261" r:id="rId6"/>
     <p:sldId id="266" r:id="rId7"/>
-    <p:sldId id="265" r:id="rId8"/>
-    <p:sldId id="267" r:id="rId9"/>
-    <p:sldId id="268" r:id="rId10"/>
-    <p:sldId id="259" r:id="rId11"/>
-    <p:sldId id="260" r:id="rId12"/>
+    <p:sldId id="269" r:id="rId8"/>
+    <p:sldId id="265" r:id="rId9"/>
+    <p:sldId id="267" r:id="rId10"/>
+    <p:sldId id="268" r:id="rId11"/>
+    <p:sldId id="259" r:id="rId12"/>
+    <p:sldId id="270" r:id="rId13"/>
+    <p:sldId id="271" r:id="rId14"/>
+    <p:sldId id="260" r:id="rId15"/>
   </p:sldIdLst>
   <p:sldSz cx="9144000" cy="6858000" type="screen4x3"/>
   <p:notesSz cx="6858000" cy="9144000"/>
@@ -363,7 +366,7 @@
           <a:p>
             <a:fld id="{99CA0067-05F1-43DF-8C28-CD4AD704C0C6}" type="datetimeFigureOut">
               <a:rPr lang="pt-BR" smtClean="0"/>
-              <a:t>07/11/2016</a:t>
+              <a:t>21/11/2016</a:t>
             </a:fld>
             <a:endParaRPr lang="pt-BR"/>
           </a:p>
@@ -405,7 +408,7 @@
           <a:p>
             <a:fld id="{E0979E90-98E3-4BC1-83E0-93EF2E5158B2}" type="slidenum">
               <a:rPr lang="pt-BR" smtClean="0"/>
-              <a:t>‹nº›</a:t>
+              <a:t>‹#›</a:t>
             </a:fld>
             <a:endParaRPr lang="pt-BR"/>
           </a:p>
@@ -576,7 +579,7 @@
           <a:p>
             <a:fld id="{99CA0067-05F1-43DF-8C28-CD4AD704C0C6}" type="datetimeFigureOut">
               <a:rPr lang="pt-BR" smtClean="0"/>
-              <a:t>07/11/2016</a:t>
+              <a:t>21/11/2016</a:t>
             </a:fld>
             <a:endParaRPr lang="pt-BR"/>
           </a:p>
@@ -618,7 +621,7 @@
           <a:p>
             <a:fld id="{E0979E90-98E3-4BC1-83E0-93EF2E5158B2}" type="slidenum">
               <a:rPr lang="pt-BR" smtClean="0"/>
-              <a:t>‹nº›</a:t>
+              <a:t>‹#›</a:t>
             </a:fld>
             <a:endParaRPr lang="pt-BR"/>
           </a:p>
@@ -751,7 +754,7 @@
           <a:p>
             <a:fld id="{99CA0067-05F1-43DF-8C28-CD4AD704C0C6}" type="datetimeFigureOut">
               <a:rPr lang="pt-BR" smtClean="0"/>
-              <a:t>07/11/2016</a:t>
+              <a:t>21/11/2016</a:t>
             </a:fld>
             <a:endParaRPr lang="pt-BR"/>
           </a:p>
@@ -793,7 +796,7 @@
           <a:p>
             <a:fld id="{E0979E90-98E3-4BC1-83E0-93EF2E5158B2}" type="slidenum">
               <a:rPr lang="pt-BR" smtClean="0"/>
-              <a:t>‹nº›</a:t>
+              <a:t>‹#›</a:t>
             </a:fld>
             <a:endParaRPr lang="pt-BR"/>
           </a:p>
@@ -916,7 +919,7 @@
           <a:p>
             <a:fld id="{99CA0067-05F1-43DF-8C28-CD4AD704C0C6}" type="datetimeFigureOut">
               <a:rPr lang="pt-BR" smtClean="0"/>
-              <a:t>07/11/2016</a:t>
+              <a:t>21/11/2016</a:t>
             </a:fld>
             <a:endParaRPr lang="pt-BR"/>
           </a:p>
@@ -958,7 +961,7 @@
           <a:p>
             <a:fld id="{E0979E90-98E3-4BC1-83E0-93EF2E5158B2}" type="slidenum">
               <a:rPr lang="pt-BR" smtClean="0"/>
-              <a:t>‹nº›</a:t>
+              <a:t>‹#›</a:t>
             </a:fld>
             <a:endParaRPr lang="pt-BR"/>
           </a:p>
@@ -1200,7 +1203,7 @@
           <a:p>
             <a:fld id="{99CA0067-05F1-43DF-8C28-CD4AD704C0C6}" type="datetimeFigureOut">
               <a:rPr lang="pt-BR" smtClean="0"/>
-              <a:t>07/11/2016</a:t>
+              <a:t>21/11/2016</a:t>
             </a:fld>
             <a:endParaRPr lang="pt-BR"/>
           </a:p>
@@ -1242,7 +1245,7 @@
           <a:p>
             <a:fld id="{E0979E90-98E3-4BC1-83E0-93EF2E5158B2}" type="slidenum">
               <a:rPr lang="pt-BR" smtClean="0"/>
-              <a:t>‹nº›</a:t>
+              <a:t>‹#›</a:t>
             </a:fld>
             <a:endParaRPr lang="pt-BR"/>
           </a:p>
@@ -1526,7 +1529,7 @@
           <a:p>
             <a:fld id="{99CA0067-05F1-43DF-8C28-CD4AD704C0C6}" type="datetimeFigureOut">
               <a:rPr lang="pt-BR" smtClean="0"/>
-              <a:t>07/11/2016</a:t>
+              <a:t>21/11/2016</a:t>
             </a:fld>
             <a:endParaRPr lang="pt-BR"/>
           </a:p>
@@ -1568,7 +1571,7 @@
           <a:p>
             <a:fld id="{E0979E90-98E3-4BC1-83E0-93EF2E5158B2}" type="slidenum">
               <a:rPr lang="pt-BR" smtClean="0"/>
-              <a:t>‹nº›</a:t>
+              <a:t>‹#›</a:t>
             </a:fld>
             <a:endParaRPr lang="pt-BR"/>
           </a:p>
@@ -1951,7 +1954,7 @@
           <a:p>
             <a:fld id="{99CA0067-05F1-43DF-8C28-CD4AD704C0C6}" type="datetimeFigureOut">
               <a:rPr lang="pt-BR" smtClean="0"/>
-              <a:t>07/11/2016</a:t>
+              <a:t>21/11/2016</a:t>
             </a:fld>
             <a:endParaRPr lang="pt-BR"/>
           </a:p>
@@ -1993,7 +1996,7 @@
           <a:p>
             <a:fld id="{E0979E90-98E3-4BC1-83E0-93EF2E5158B2}" type="slidenum">
               <a:rPr lang="pt-BR" smtClean="0"/>
-              <a:t>‹nº›</a:t>
+              <a:t>‹#›</a:t>
             </a:fld>
             <a:endParaRPr lang="pt-BR"/>
           </a:p>
@@ -2124,7 +2127,7 @@
           <a:p>
             <a:fld id="{99CA0067-05F1-43DF-8C28-CD4AD704C0C6}" type="datetimeFigureOut">
               <a:rPr lang="pt-BR" smtClean="0"/>
-              <a:t>07/11/2016</a:t>
+              <a:t>21/11/2016</a:t>
             </a:fld>
             <a:endParaRPr lang="pt-BR"/>
           </a:p>
@@ -2166,7 +2169,7 @@
           <a:p>
             <a:fld id="{E0979E90-98E3-4BC1-83E0-93EF2E5158B2}" type="slidenum">
               <a:rPr lang="pt-BR" smtClean="0"/>
-              <a:t>‹nº›</a:t>
+              <a:t>‹#›</a:t>
             </a:fld>
             <a:endParaRPr lang="pt-BR"/>
           </a:p>
@@ -2214,7 +2217,7 @@
           <a:p>
             <a:fld id="{99CA0067-05F1-43DF-8C28-CD4AD704C0C6}" type="datetimeFigureOut">
               <a:rPr lang="pt-BR" smtClean="0"/>
-              <a:t>07/11/2016</a:t>
+              <a:t>21/11/2016</a:t>
             </a:fld>
             <a:endParaRPr lang="pt-BR"/>
           </a:p>
@@ -2256,7 +2259,7 @@
           <a:p>
             <a:fld id="{E0979E90-98E3-4BC1-83E0-93EF2E5158B2}" type="slidenum">
               <a:rPr lang="pt-BR" smtClean="0"/>
-              <a:t>‹nº›</a:t>
+              <a:t>‹#›</a:t>
             </a:fld>
             <a:endParaRPr lang="pt-BR"/>
           </a:p>
@@ -2494,7 +2497,7 @@
           <a:p>
             <a:fld id="{99CA0067-05F1-43DF-8C28-CD4AD704C0C6}" type="datetimeFigureOut">
               <a:rPr lang="pt-BR" smtClean="0"/>
-              <a:t>07/11/2016</a:t>
+              <a:t>21/11/2016</a:t>
             </a:fld>
             <a:endParaRPr lang="pt-BR"/>
           </a:p>
@@ -2536,7 +2539,7 @@
           <a:p>
             <a:fld id="{E0979E90-98E3-4BC1-83E0-93EF2E5158B2}" type="slidenum">
               <a:rPr lang="pt-BR" smtClean="0"/>
-              <a:t>‹nº›</a:t>
+              <a:t>‹#›</a:t>
             </a:fld>
             <a:endParaRPr lang="pt-BR"/>
           </a:p>
@@ -2793,7 +2796,7 @@
           <a:p>
             <a:fld id="{99CA0067-05F1-43DF-8C28-CD4AD704C0C6}" type="datetimeFigureOut">
               <a:rPr lang="pt-BR" smtClean="0"/>
-              <a:t>07/11/2016</a:t>
+              <a:t>21/11/2016</a:t>
             </a:fld>
             <a:endParaRPr lang="pt-BR"/>
           </a:p>
@@ -2835,7 +2838,7 @@
           <a:p>
             <a:fld id="{E0979E90-98E3-4BC1-83E0-93EF2E5158B2}" type="slidenum">
               <a:rPr lang="pt-BR" smtClean="0"/>
-              <a:t>‹nº›</a:t>
+              <a:t>‹#›</a:t>
             </a:fld>
             <a:endParaRPr lang="pt-BR"/>
           </a:p>
@@ -3003,7 +3006,7 @@
           <a:p>
             <a:fld id="{99CA0067-05F1-43DF-8C28-CD4AD704C0C6}" type="datetimeFigureOut">
               <a:rPr lang="pt-BR" smtClean="0"/>
-              <a:t>07/11/2016</a:t>
+              <a:t>21/11/2016</a:t>
             </a:fld>
             <a:endParaRPr lang="pt-BR"/>
           </a:p>
@@ -3084,7 +3087,7 @@
           <a:p>
             <a:fld id="{E0979E90-98E3-4BC1-83E0-93EF2E5158B2}" type="slidenum">
               <a:rPr lang="pt-BR" smtClean="0"/>
-              <a:t>‹nº›</a:t>
+              <a:t>‹#›</a:t>
             </a:fld>
             <a:endParaRPr lang="pt-BR"/>
           </a:p>
@@ -3634,19 +3637,22 @@
         </p:nvSpPr>
         <p:spPr>
           <a:xfrm>
-            <a:off x="755576" y="692696"/>
+            <a:off x="992560" y="364866"/>
             <a:ext cx="6781800" cy="1600200"/>
           </a:xfrm>
         </p:spPr>
         <p:txBody>
-          <a:bodyPr/>
+          <a:bodyPr>
+            <a:normAutofit fontScale="90000"/>
+          </a:bodyPr>
           <a:lstStyle/>
           <a:p>
+            <a:pPr algn="ctr"/>
             <a:r>
               <a:rPr lang="pt-BR" dirty="0">
-                <a:latin typeface="Baskerville Old Face" panose="02020602080505020303" pitchFamily="18" charset="0"/>
+                <a:latin typeface="Baskerville Old Face" panose="02020602080505020303"/>
               </a:rPr>
-              <a:t>EXEMPLOS</a:t>
+              <a:t>Funções usadas no refinamento</a:t>
             </a:r>
           </a:p>
         </p:txBody>
@@ -3663,7 +3669,7 @@
         </p:nvSpPr>
         <p:spPr>
           <a:xfrm>
-            <a:off x="755576" y="2276872"/>
+            <a:off x="611560" y="1932856"/>
             <a:ext cx="7543800" cy="3886200"/>
           </a:xfrm>
         </p:spPr>
@@ -3671,14 +3677,535 @@
           <a:bodyPr/>
           <a:lstStyle/>
           <a:p>
+            <a:r>
+              <a:rPr lang="pt-BR" dirty="0"/>
+              <a:t>1: int Círculo( polinômio P </a:t>
+            </a:r>
+            <a:r>
+              <a:rPr lang="pt-BR" dirty="0" smtClean="0"/>
+              <a:t>)</a:t>
+            </a:r>
+          </a:p>
+          <a:p>
             <a:endParaRPr lang="pt-BR" dirty="0"/>
           </a:p>
-        </p:txBody>
-      </p:sp>
+          <a:p>
+            <a:r>
+              <a:rPr lang="pt-BR" dirty="0"/>
+              <a:t>2: polinômio divPolinomio (polinômio p1, polinômio p2</a:t>
+            </a:r>
+            <a:r>
+              <a:rPr lang="pt-BR" dirty="0" smtClean="0"/>
+              <a:t>)</a:t>
+            </a:r>
+          </a:p>
+          <a:p>
+            <a:endParaRPr lang="pt-BR" dirty="0" smtClean="0"/>
+          </a:p>
+          <a:p>
+            <a:endParaRPr lang="pt-BR" dirty="0" smtClean="0"/>
+          </a:p>
+          <a:p>
+            <a:r>
+              <a:rPr lang="pt-BR" dirty="0" smtClean="0"/>
+              <a:t>3</a:t>
+            </a:r>
+            <a:r>
+              <a:rPr lang="pt-BR" dirty="0"/>
+              <a:t>: intervalos nZeros (Polinomio P, intervalo I,  índice i)</a:t>
+            </a:r>
+          </a:p>
+        </p:txBody>
+      </p:sp>
+      <p:graphicFrame>
+        <p:nvGraphicFramePr>
+          <p:cNvPr id="5" name="Content Placeholder 4"/>
+          <p:cNvGraphicFramePr>
+            <a:graphicFrameLocks/>
+          </p:cNvGraphicFramePr>
+          <p:nvPr>
+            <p:extLst>
+              <p:ext uri="{D42A27DB-BD31-4B8C-83A1-F6EECF244321}">
+                <p14:modId xmlns:p14="http://schemas.microsoft.com/office/powerpoint/2010/main" val="583418235"/>
+              </p:ext>
+            </p:extLst>
+          </p:nvPr>
+        </p:nvGraphicFramePr>
+        <p:xfrm>
+          <a:off x="611560" y="2996952"/>
+          <a:ext cx="7543800" cy="365760"/>
+        </p:xfrm>
+        <a:graphic>
+          <a:graphicData uri="http://schemas.openxmlformats.org/drawingml/2006/table">
+            <a:tbl>
+              <a:tblPr/>
+              <a:tblGrid>
+                <a:gridCol w="7543800">
+                  <a:extLst>
+                    <a:ext uri="{9D8B030D-6E8A-4147-A177-3AD203B41FA5}">
+                      <a16:colId xmlns:a16="http://schemas.microsoft.com/office/drawing/2014/main" val="2942055312"/>
+                    </a:ext>
+                  </a:extLst>
+                </a:gridCol>
+              </a:tblGrid>
+              <a:tr h="0">
+                <a:tc>
+                  <a:txBody>
+                    <a:bodyPr/>
+                    <a:lstStyle/>
+                    <a:p>
+                      <a:pPr fontAlgn="t"/>
+                      <a:r>
+                        <a:rPr lang="pt-BR" b="0" i="0" dirty="0" smtClean="0">
+                          <a:solidFill>
+                            <a:srgbClr val="A71D5D"/>
+                          </a:solidFill>
+                          <a:effectLst/>
+                          <a:latin typeface="Consolas" panose="020B0609020204030204" pitchFamily="49" charset="0"/>
+                        </a:rPr>
+                        <a:t>double</a:t>
+                      </a:r>
+                      <a:r>
+                        <a:rPr lang="pt-BR" b="0" i="0" dirty="0" smtClean="0">
+                          <a:solidFill>
+                            <a:srgbClr val="333333"/>
+                          </a:solidFill>
+                          <a:effectLst/>
+                          <a:latin typeface="Consolas" panose="020B0609020204030204" pitchFamily="49" charset="0"/>
+                        </a:rPr>
+                        <a:t> </a:t>
+                      </a:r>
+                      <a:r>
+                        <a:rPr lang="pt-BR" b="0" i="0" dirty="0" smtClean="0">
+                          <a:solidFill>
+                            <a:srgbClr val="795DA3"/>
+                          </a:solidFill>
+                          <a:effectLst/>
+                          <a:latin typeface="Consolas" panose="020B0609020204030204" pitchFamily="49" charset="0"/>
+                        </a:rPr>
+                        <a:t>Newton::circulo</a:t>
+                      </a:r>
+                      <a:r>
+                        <a:rPr lang="pt-BR" b="0" i="0" dirty="0" smtClean="0">
+                          <a:solidFill>
+                            <a:srgbClr val="333333"/>
+                          </a:solidFill>
+                          <a:effectLst/>
+                          <a:latin typeface="Consolas" panose="020B0609020204030204" pitchFamily="49" charset="0"/>
+                        </a:rPr>
+                        <a:t>(std::vector&lt;</a:t>
+                      </a:r>
+                      <a:r>
+                        <a:rPr lang="pt-BR" b="0" i="0" dirty="0" smtClean="0">
+                          <a:solidFill>
+                            <a:srgbClr val="A71D5D"/>
+                          </a:solidFill>
+                          <a:effectLst/>
+                          <a:latin typeface="Consolas" panose="020B0609020204030204" pitchFamily="49" charset="0"/>
+                        </a:rPr>
+                        <a:t>double</a:t>
+                      </a:r>
+                      <a:r>
+                        <a:rPr lang="pt-BR" b="0" i="0" dirty="0" smtClean="0">
+                          <a:solidFill>
+                            <a:srgbClr val="333333"/>
+                          </a:solidFill>
+                          <a:effectLst/>
+                          <a:latin typeface="Consolas" panose="020B0609020204030204" pitchFamily="49" charset="0"/>
+                        </a:rPr>
+                        <a:t>&gt; a)</a:t>
+                      </a:r>
+                      <a:endParaRPr lang="pt-BR" dirty="0">
+                        <a:solidFill>
+                          <a:srgbClr val="333333"/>
+                        </a:solidFill>
+                        <a:effectLst/>
+                        <a:latin typeface="Consolas" panose="020B0609020204030204" pitchFamily="49" charset="0"/>
+                      </a:endParaRPr>
+                    </a:p>
+                  </a:txBody>
+                  <a:tcPr marL="95250" marR="95250">
+                    <a:lnL>
+                      <a:noFill/>
+                    </a:lnL>
+                    <a:lnR>
+                      <a:noFill/>
+                    </a:lnR>
+                    <a:lnT>
+                      <a:noFill/>
+                    </a:lnT>
+                    <a:lnB>
+                      <a:noFill/>
+                    </a:lnB>
+                    <a:solidFill>
+                      <a:srgbClr val="FFFFFF"/>
+                    </a:solidFill>
+                  </a:tcPr>
+                </a:tc>
+                <a:extLst>
+                  <a:ext uri="{0D108BD9-81ED-4DB2-BD59-A6C34878D82A}">
+                    <a16:rowId xmlns:a16="http://schemas.microsoft.com/office/drawing/2014/main" val="1226812299"/>
+                  </a:ext>
+                </a:extLst>
+              </a:tr>
+            </a:tbl>
+          </a:graphicData>
+        </a:graphic>
+      </p:graphicFrame>
+      <p:graphicFrame>
+        <p:nvGraphicFramePr>
+          <p:cNvPr id="6" name="Content Placeholder 4"/>
+          <p:cNvGraphicFramePr>
+            <a:graphicFrameLocks/>
+          </p:cNvGraphicFramePr>
+          <p:nvPr>
+            <p:extLst>
+              <p:ext uri="{D42A27DB-BD31-4B8C-83A1-F6EECF244321}">
+                <p14:modId xmlns:p14="http://schemas.microsoft.com/office/powerpoint/2010/main" val="60013242"/>
+              </p:ext>
+            </p:extLst>
+          </p:nvPr>
+        </p:nvGraphicFramePr>
+        <p:xfrm>
+          <a:off x="611560" y="3875956"/>
+          <a:ext cx="7543800" cy="914400"/>
+        </p:xfrm>
+        <a:graphic>
+          <a:graphicData uri="http://schemas.openxmlformats.org/drawingml/2006/table">
+            <a:tbl>
+              <a:tblPr/>
+              <a:tblGrid>
+                <a:gridCol w="7543800">
+                  <a:extLst>
+                    <a:ext uri="{9D8B030D-6E8A-4147-A177-3AD203B41FA5}">
+                      <a16:colId xmlns:a16="http://schemas.microsoft.com/office/drawing/2014/main" val="2942055312"/>
+                    </a:ext>
+                  </a:extLst>
+                </a:gridCol>
+              </a:tblGrid>
+              <a:tr h="0">
+                <a:tc>
+                  <a:txBody>
+                    <a:bodyPr/>
+                    <a:lstStyle/>
+                    <a:p>
+                      <a:pPr fontAlgn="t"/>
+                      <a:r>
+                        <a:rPr lang="pt-BR" b="0" i="0" dirty="0" smtClean="0">
+                          <a:solidFill>
+                            <a:srgbClr val="333333"/>
+                          </a:solidFill>
+                          <a:effectLst/>
+                          <a:latin typeface="Consolas" panose="020B0609020204030204" pitchFamily="49" charset="0"/>
+                        </a:rPr>
+                        <a:t>std::vector&lt;</a:t>
+                      </a:r>
+                      <a:r>
+                        <a:rPr lang="pt-BR" b="0" i="0" dirty="0" smtClean="0">
+                          <a:solidFill>
+                            <a:srgbClr val="A71D5D"/>
+                          </a:solidFill>
+                          <a:effectLst/>
+                          <a:latin typeface="Consolas" panose="020B0609020204030204" pitchFamily="49" charset="0"/>
+                        </a:rPr>
+                        <a:t>double</a:t>
+                      </a:r>
+                      <a:r>
+                        <a:rPr lang="pt-BR" b="0" i="0" dirty="0" smtClean="0">
+                          <a:solidFill>
+                            <a:srgbClr val="333333"/>
+                          </a:solidFill>
+                          <a:effectLst/>
+                          <a:latin typeface="Consolas" panose="020B0609020204030204" pitchFamily="49" charset="0"/>
+                        </a:rPr>
+                        <a:t>&gt; </a:t>
+                      </a:r>
+                      <a:r>
+                        <a:rPr lang="pt-BR" b="0" i="0" dirty="0" smtClean="0">
+                          <a:solidFill>
+                            <a:srgbClr val="795DA3"/>
+                          </a:solidFill>
+                          <a:effectLst/>
+                          <a:latin typeface="Consolas" panose="020B0609020204030204" pitchFamily="49" charset="0"/>
+                        </a:rPr>
+                        <a:t>Newton::divisaoPolinomio</a:t>
+                      </a:r>
+                      <a:r>
+                        <a:rPr lang="pt-BR" b="0" i="0" dirty="0" smtClean="0">
+                          <a:solidFill>
+                            <a:srgbClr val="333333"/>
+                          </a:solidFill>
+                          <a:effectLst/>
+                          <a:latin typeface="Consolas" panose="020B0609020204030204" pitchFamily="49" charset="0"/>
+                        </a:rPr>
+                        <a:t>(std::vector&lt;</a:t>
+                      </a:r>
+                      <a:r>
+                        <a:rPr lang="pt-BR" b="0" i="0" dirty="0" smtClean="0">
+                          <a:solidFill>
+                            <a:srgbClr val="A71D5D"/>
+                          </a:solidFill>
+                          <a:effectLst/>
+                          <a:latin typeface="Consolas" panose="020B0609020204030204" pitchFamily="49" charset="0"/>
+                        </a:rPr>
+                        <a:t>double</a:t>
+                      </a:r>
+                      <a:r>
+                        <a:rPr lang="pt-BR" b="0" i="0" dirty="0" smtClean="0">
+                          <a:solidFill>
+                            <a:srgbClr val="333333"/>
+                          </a:solidFill>
+                          <a:effectLst/>
+                          <a:latin typeface="Consolas" panose="020B0609020204030204" pitchFamily="49" charset="0"/>
+                        </a:rPr>
+                        <a:t>&gt; a, std::vector&lt;</a:t>
+                      </a:r>
+                      <a:r>
+                        <a:rPr lang="pt-BR" b="0" i="0" dirty="0" smtClean="0">
+                          <a:solidFill>
+                            <a:srgbClr val="A71D5D"/>
+                          </a:solidFill>
+                          <a:effectLst/>
+                          <a:latin typeface="Consolas" panose="020B0609020204030204" pitchFamily="49" charset="0"/>
+                        </a:rPr>
+                        <a:t>double</a:t>
+                      </a:r>
+                      <a:r>
+                        <a:rPr lang="pt-BR" b="0" i="0" dirty="0" smtClean="0">
+                          <a:solidFill>
+                            <a:srgbClr val="333333"/>
+                          </a:solidFill>
+                          <a:effectLst/>
+                          <a:latin typeface="Consolas" panose="020B0609020204030204" pitchFamily="49" charset="0"/>
+                        </a:rPr>
+                        <a:t>&gt; b)</a:t>
+                      </a:r>
+                      <a:endParaRPr lang="pt-BR" dirty="0">
+                        <a:solidFill>
+                          <a:srgbClr val="333333"/>
+                        </a:solidFill>
+                        <a:effectLst/>
+                        <a:latin typeface="Consolas" panose="020B0609020204030204" pitchFamily="49" charset="0"/>
+                      </a:endParaRPr>
+                    </a:p>
+                  </a:txBody>
+                  <a:tcPr marL="95250" marR="95250">
+                    <a:lnL>
+                      <a:noFill/>
+                    </a:lnL>
+                    <a:lnR>
+                      <a:noFill/>
+                    </a:lnR>
+                    <a:lnT>
+                      <a:noFill/>
+                    </a:lnT>
+                    <a:lnB>
+                      <a:noFill/>
+                    </a:lnB>
+                    <a:solidFill>
+                      <a:srgbClr val="FFFFFF"/>
+                    </a:solidFill>
+                  </a:tcPr>
+                </a:tc>
+                <a:extLst>
+                  <a:ext uri="{0D108BD9-81ED-4DB2-BD59-A6C34878D82A}">
+                    <a16:rowId xmlns:a16="http://schemas.microsoft.com/office/drawing/2014/main" val="1226812299"/>
+                  </a:ext>
+                </a:extLst>
+              </a:tr>
+            </a:tbl>
+          </a:graphicData>
+        </a:graphic>
+      </p:graphicFrame>
+      <p:graphicFrame>
+        <p:nvGraphicFramePr>
+          <p:cNvPr id="7" name="Content Placeholder 4"/>
+          <p:cNvGraphicFramePr>
+            <a:graphicFrameLocks/>
+          </p:cNvGraphicFramePr>
+          <p:nvPr>
+            <p:extLst>
+              <p:ext uri="{D42A27DB-BD31-4B8C-83A1-F6EECF244321}">
+                <p14:modId xmlns:p14="http://schemas.microsoft.com/office/powerpoint/2010/main" val="83629023"/>
+              </p:ext>
+            </p:extLst>
+          </p:nvPr>
+        </p:nvGraphicFramePr>
+        <p:xfrm>
+          <a:off x="611560" y="5161278"/>
+          <a:ext cx="7543800" cy="640080"/>
+        </p:xfrm>
+        <a:graphic>
+          <a:graphicData uri="http://schemas.openxmlformats.org/drawingml/2006/table">
+            <a:tbl>
+              <a:tblPr/>
+              <a:tblGrid>
+                <a:gridCol w="7543800">
+                  <a:extLst>
+                    <a:ext uri="{9D8B030D-6E8A-4147-A177-3AD203B41FA5}">
+                      <a16:colId xmlns:a16="http://schemas.microsoft.com/office/drawing/2014/main" val="2942055312"/>
+                    </a:ext>
+                  </a:extLst>
+                </a:gridCol>
+              </a:tblGrid>
+              <a:tr h="0">
+                <a:tc>
+                  <a:txBody>
+                    <a:bodyPr/>
+                    <a:lstStyle/>
+                    <a:p>
+                      <a:pPr fontAlgn="t"/>
+                      <a:r>
+                        <a:rPr lang="pt-BR" b="0" i="0" dirty="0" smtClean="0">
+                          <a:solidFill>
+                            <a:srgbClr val="333333"/>
+                          </a:solidFill>
+                          <a:effectLst/>
+                          <a:latin typeface="Consolas" panose="020B0609020204030204" pitchFamily="49" charset="0"/>
+                        </a:rPr>
+                        <a:t>std::vector&lt;</a:t>
+                      </a:r>
+                      <a:r>
+                        <a:rPr lang="pt-BR" b="0" i="0" dirty="0" smtClean="0">
+                          <a:solidFill>
+                            <a:srgbClr val="A71D5D"/>
+                          </a:solidFill>
+                          <a:effectLst/>
+                          <a:latin typeface="Consolas" panose="020B0609020204030204" pitchFamily="49" charset="0"/>
+                        </a:rPr>
+                        <a:t>double</a:t>
+                      </a:r>
+                      <a:r>
+                        <a:rPr lang="pt-BR" b="0" i="0" dirty="0" smtClean="0">
+                          <a:solidFill>
+                            <a:srgbClr val="333333"/>
+                          </a:solidFill>
+                          <a:effectLst/>
+                          <a:latin typeface="Consolas" panose="020B0609020204030204" pitchFamily="49" charset="0"/>
+                        </a:rPr>
+                        <a:t>&gt; </a:t>
+                      </a:r>
+                      <a:r>
+                        <a:rPr lang="pt-BR" b="0" i="0" dirty="0" smtClean="0">
+                          <a:solidFill>
+                            <a:srgbClr val="795DA3"/>
+                          </a:solidFill>
+                          <a:effectLst/>
+                          <a:latin typeface="Consolas" panose="020B0609020204030204" pitchFamily="49" charset="0"/>
+                        </a:rPr>
+                        <a:t>Newton::nZeros</a:t>
+                      </a:r>
+                      <a:r>
+                        <a:rPr lang="pt-BR" b="0" i="0" dirty="0" smtClean="0">
+                          <a:solidFill>
+                            <a:srgbClr val="333333"/>
+                          </a:solidFill>
+                          <a:effectLst/>
+                          <a:latin typeface="Consolas" panose="020B0609020204030204" pitchFamily="49" charset="0"/>
+                        </a:rPr>
+                        <a:t>(std::vector&lt;</a:t>
+                      </a:r>
+                      <a:r>
+                        <a:rPr lang="pt-BR" b="0" i="0" dirty="0" smtClean="0">
+                          <a:solidFill>
+                            <a:srgbClr val="A71D5D"/>
+                          </a:solidFill>
+                          <a:effectLst/>
+                          <a:latin typeface="Consolas" panose="020B0609020204030204" pitchFamily="49" charset="0"/>
+                        </a:rPr>
+                        <a:t>double</a:t>
+                      </a:r>
+                      <a:r>
+                        <a:rPr lang="pt-BR" b="0" i="0" dirty="0" smtClean="0">
+                          <a:solidFill>
+                            <a:srgbClr val="333333"/>
+                          </a:solidFill>
+                          <a:effectLst/>
+                          <a:latin typeface="Consolas" panose="020B0609020204030204" pitchFamily="49" charset="0"/>
+                        </a:rPr>
+                        <a:t>&gt; I, std::vector&lt;</a:t>
+                      </a:r>
+                      <a:r>
+                        <a:rPr lang="pt-BR" b="0" i="0" dirty="0" smtClean="0">
+                          <a:solidFill>
+                            <a:srgbClr val="A71D5D"/>
+                          </a:solidFill>
+                          <a:effectLst/>
+                          <a:latin typeface="Consolas" panose="020B0609020204030204" pitchFamily="49" charset="0"/>
+                        </a:rPr>
+                        <a:t>double</a:t>
+                      </a:r>
+                      <a:r>
+                        <a:rPr lang="pt-BR" b="0" i="0" dirty="0" smtClean="0">
+                          <a:solidFill>
+                            <a:srgbClr val="333333"/>
+                          </a:solidFill>
+                          <a:effectLst/>
+                          <a:latin typeface="Consolas" panose="020B0609020204030204" pitchFamily="49" charset="0"/>
+                        </a:rPr>
+                        <a:t>&gt; a, </a:t>
+                      </a:r>
+                      <a:r>
+                        <a:rPr lang="pt-BR" b="0" i="0" dirty="0" smtClean="0">
+                          <a:solidFill>
+                            <a:srgbClr val="A71D5D"/>
+                          </a:solidFill>
+                          <a:effectLst/>
+                          <a:latin typeface="Consolas" panose="020B0609020204030204" pitchFamily="49" charset="0"/>
+                        </a:rPr>
+                        <a:t>int</a:t>
+                      </a:r>
+                      <a:r>
+                        <a:rPr lang="pt-BR" b="0" i="0" dirty="0" smtClean="0">
+                          <a:solidFill>
+                            <a:srgbClr val="333333"/>
+                          </a:solidFill>
+                          <a:effectLst/>
+                          <a:latin typeface="Consolas" panose="020B0609020204030204" pitchFamily="49" charset="0"/>
+                        </a:rPr>
+                        <a:t> i)</a:t>
+                      </a:r>
+                      <a:endParaRPr lang="pt-BR" dirty="0">
+                        <a:solidFill>
+                          <a:srgbClr val="333333"/>
+                        </a:solidFill>
+                        <a:effectLst/>
+                        <a:latin typeface="Consolas" panose="020B0609020204030204" pitchFamily="49" charset="0"/>
+                      </a:endParaRPr>
+                    </a:p>
+                  </a:txBody>
+                  <a:tcPr marL="95250" marR="95250">
+                    <a:lnL>
+                      <a:noFill/>
+                    </a:lnL>
+                    <a:lnR>
+                      <a:noFill/>
+                    </a:lnR>
+                    <a:lnT>
+                      <a:noFill/>
+                    </a:lnT>
+                    <a:lnB>
+                      <a:noFill/>
+                    </a:lnB>
+                    <a:solidFill>
+                      <a:srgbClr val="FFFFFF"/>
+                    </a:solidFill>
+                  </a:tcPr>
+                </a:tc>
+                <a:extLst>
+                  <a:ext uri="{0D108BD9-81ED-4DB2-BD59-A6C34878D82A}">
+                    <a16:rowId xmlns:a16="http://schemas.microsoft.com/office/drawing/2014/main" val="1226812299"/>
+                  </a:ext>
+                </a:extLst>
+              </a:tr>
+            </a:tbl>
+          </a:graphicData>
+        </a:graphic>
+      </p:graphicFrame>
     </p:spTree>
     <p:extLst>
       <p:ext uri="{BB962C8B-B14F-4D97-AF65-F5344CB8AC3E}">
-        <p14:creationId xmlns:p14="http://schemas.microsoft.com/office/powerpoint/2010/main" val="2260328864"/>
+        <p14:creationId xmlns:p14="http://schemas.microsoft.com/office/powerpoint/2010/main" val="441614925"/>
       </p:ext>
     </p:extLst>
   </p:cSld>
@@ -3729,6 +4256,906 @@
               <a:rPr lang="pt-BR" dirty="0">
                 <a:latin typeface="Baskerville Old Face" panose="02020602080505020303" pitchFamily="18" charset="0"/>
               </a:rPr>
+              <a:t>EXEMPLOS</a:t>
+            </a:r>
+          </a:p>
+        </p:txBody>
+      </p:sp>
+      <mc:AlternateContent xmlns:mc="http://schemas.openxmlformats.org/markup-compatibility/2006">
+        <mc:Choice xmlns:a14="http://schemas.microsoft.com/office/drawing/2010/main" Requires="a14">
+          <p:sp>
+            <p:nvSpPr>
+              <p:cNvPr id="3" name="Espaço Reservado para Conteúdo 2"/>
+              <p:cNvSpPr>
+                <a:spLocks noGrp="1"/>
+              </p:cNvSpPr>
+              <p:nvPr>
+                <p:ph idx="1"/>
+              </p:nvPr>
+            </p:nvSpPr>
+            <p:spPr>
+              <a:xfrm>
+                <a:off x="755576" y="2292896"/>
+                <a:ext cx="7543800" cy="3310136"/>
+              </a:xfrm>
+            </p:spPr>
+            <p:txBody>
+              <a:bodyPr/>
+              <a:lstStyle/>
+              <a:p>
+                <a:r>
+                  <a:rPr lang="pt-BR" dirty="0" smtClean="0"/>
+                  <a:t>Exemplo 1</a:t>
+                </a:r>
+              </a:p>
+              <a:p>
+                <a:pPr lvl="1"/>
+                <a14:m>
+                  <m:oMath xmlns:m="http://schemas.openxmlformats.org/officeDocument/2006/math">
+                    <m:sSup>
+                      <m:sSupPr>
+                        <m:ctrlPr>
+                          <a:rPr lang="pt-BR" i="1">
+                            <a:latin typeface="Cambria Math" panose="02040503050406030204" pitchFamily="18" charset="0"/>
+                          </a:rPr>
+                        </m:ctrlPr>
+                      </m:sSupPr>
+                      <m:e>
+                        <m:r>
+                          <a:rPr lang="pt-BR" b="0" i="1" smtClean="0">
+                            <a:latin typeface="Cambria Math" panose="02040503050406030204" pitchFamily="18" charset="0"/>
+                          </a:rPr>
+                          <m:t>𝑥</m:t>
+                        </m:r>
+                      </m:e>
+                      <m:sup>
+                        <m:r>
+                          <a:rPr lang="pt-BR" i="1">
+                            <a:latin typeface="Cambria Math"/>
+                          </a:rPr>
+                          <m:t>4</m:t>
+                        </m:r>
+                      </m:sup>
+                    </m:sSup>
+                    <m:r>
+                      <a:rPr lang="pt-BR" b="0" i="1" smtClean="0">
+                        <a:latin typeface="Cambria Math" panose="02040503050406030204" pitchFamily="18" charset="0"/>
+                      </a:rPr>
+                      <m:t>−5</m:t>
+                    </m:r>
+                    <m:sSup>
+                      <m:sSupPr>
+                        <m:ctrlPr>
+                          <a:rPr lang="pt-BR" i="1">
+                            <a:latin typeface="Cambria Math" panose="02040503050406030204" pitchFamily="18" charset="0"/>
+                          </a:rPr>
+                        </m:ctrlPr>
+                      </m:sSupPr>
+                      <m:e>
+                        <m:r>
+                          <a:rPr lang="pt-BR" b="0" i="1" smtClean="0">
+                            <a:latin typeface="Cambria Math" panose="02040503050406030204" pitchFamily="18" charset="0"/>
+                          </a:rPr>
+                          <m:t>𝑥</m:t>
+                        </m:r>
+                      </m:e>
+                      <m:sup>
+                        <m:r>
+                          <a:rPr lang="pt-BR" i="1">
+                            <a:latin typeface="Cambria Math" panose="02040503050406030204" pitchFamily="18" charset="0"/>
+                          </a:rPr>
+                          <m:t>3</m:t>
+                        </m:r>
+                      </m:sup>
+                    </m:sSup>
+                    <m:r>
+                      <a:rPr lang="pt-BR" i="1">
+                        <a:latin typeface="Cambria Math" panose="02040503050406030204" pitchFamily="18" charset="0"/>
+                      </a:rPr>
+                      <m:t>+</m:t>
+                    </m:r>
+                    <m:r>
+                      <a:rPr lang="pt-BR" b="0" i="1" smtClean="0">
+                        <a:latin typeface="Cambria Math" panose="02040503050406030204" pitchFamily="18" charset="0"/>
+                      </a:rPr>
+                      <m:t>6</m:t>
+                    </m:r>
+                    <m:sSup>
+                      <m:sSupPr>
+                        <m:ctrlPr>
+                          <a:rPr lang="pt-BR" i="1">
+                            <a:latin typeface="Cambria Math" panose="02040503050406030204" pitchFamily="18" charset="0"/>
+                          </a:rPr>
+                        </m:ctrlPr>
+                      </m:sSupPr>
+                      <m:e>
+                        <m:r>
+                          <a:rPr lang="pt-BR" b="0" i="1" smtClean="0">
+                            <a:latin typeface="Cambria Math" panose="02040503050406030204" pitchFamily="18" charset="0"/>
+                          </a:rPr>
+                          <m:t>𝑥</m:t>
+                        </m:r>
+                      </m:e>
+                      <m:sup>
+                        <m:r>
+                          <a:rPr lang="pt-BR" i="1">
+                            <a:latin typeface="Cambria Math" panose="02040503050406030204" pitchFamily="18" charset="0"/>
+                          </a:rPr>
+                          <m:t>2</m:t>
+                        </m:r>
+                      </m:sup>
+                    </m:sSup>
+                    <m:r>
+                      <a:rPr lang="pt-BR" i="1">
+                        <a:latin typeface="Cambria Math" panose="02040503050406030204" pitchFamily="18" charset="0"/>
+                      </a:rPr>
+                      <m:t>+</m:t>
+                    </m:r>
+                    <m:r>
+                      <a:rPr lang="pt-BR" b="0" i="1" smtClean="0">
+                        <a:latin typeface="Cambria Math" panose="02040503050406030204" pitchFamily="18" charset="0"/>
+                      </a:rPr>
+                      <m:t>4</m:t>
+                    </m:r>
+                    <m:sSup>
+                      <m:sSupPr>
+                        <m:ctrlPr>
+                          <a:rPr lang="pt-BR" i="1">
+                            <a:latin typeface="Cambria Math" panose="02040503050406030204" pitchFamily="18" charset="0"/>
+                          </a:rPr>
+                        </m:ctrlPr>
+                      </m:sSupPr>
+                      <m:e>
+                        <m:r>
+                          <a:rPr lang="pt-BR" b="0" i="1" smtClean="0">
+                            <a:latin typeface="Cambria Math" panose="02040503050406030204" pitchFamily="18" charset="0"/>
+                          </a:rPr>
+                          <m:t>𝑥</m:t>
+                        </m:r>
+                      </m:e>
+                      <m:sup>
+                        <m:r>
+                          <a:rPr lang="pt-BR" i="1">
+                            <a:latin typeface="Cambria Math" panose="02040503050406030204" pitchFamily="18" charset="0"/>
+                          </a:rPr>
+                          <m:t>1</m:t>
+                        </m:r>
+                      </m:sup>
+                    </m:sSup>
+                    <m:r>
+                      <a:rPr lang="pt-BR" b="0" i="1" smtClean="0">
+                        <a:latin typeface="Cambria Math" panose="02040503050406030204" pitchFamily="18" charset="0"/>
+                      </a:rPr>
+                      <m:t>−8</m:t>
+                    </m:r>
+                  </m:oMath>
+                </a14:m>
+                <a:endParaRPr lang="pt-BR" b="0" dirty="0" smtClean="0"/>
+              </a:p>
+              <a:p>
+                <a:pPr lvl="1"/>
+                <a:r>
+                  <a:rPr lang="pt-BR" dirty="0" smtClean="0"/>
+                  <a:t>Raiz: 2</a:t>
+                </a:r>
+              </a:p>
+              <a:p>
+                <a:pPr lvl="1"/>
+                <a:r>
+                  <a:rPr lang="pt-BR" dirty="0" smtClean="0"/>
+                  <a:t>Multiplicidade: 3</a:t>
+                </a:r>
+              </a:p>
+              <a:p>
+                <a:pPr lvl="1"/>
+                <a:r>
+                  <a:rPr lang="pt-BR" dirty="0" smtClean="0"/>
+                  <a:t>Newton-Raphson: 3 passos</a:t>
+                </a:r>
+              </a:p>
+              <a:p>
+                <a:pPr lvl="1"/>
+                <a:r>
+                  <a:rPr lang="pt-BR" dirty="0" smtClean="0"/>
+                  <a:t>Secante: 9 passos</a:t>
+                </a:r>
+                <a:endParaRPr lang="pt-BR" dirty="0"/>
+              </a:p>
+            </p:txBody>
+          </p:sp>
+        </mc:Choice>
+        <mc:Fallback>
+          <p:sp>
+            <p:nvSpPr>
+              <p:cNvPr id="3" name="Espaço Reservado para Conteúdo 2"/>
+              <p:cNvSpPr>
+                <a:spLocks noGrp="1" noRot="1" noChangeAspect="1" noMove="1" noResize="1" noEditPoints="1" noAdjustHandles="1" noChangeArrowheads="1" noChangeShapeType="1" noTextEdit="1"/>
+              </p:cNvSpPr>
+              <p:nvPr>
+                <p:ph idx="1"/>
+              </p:nvPr>
+            </p:nvSpPr>
+            <p:spPr>
+              <a:xfrm>
+                <a:off x="755576" y="2292896"/>
+                <a:ext cx="7543800" cy="3310136"/>
+              </a:xfrm>
+              <a:blipFill>
+                <a:blip r:embed="rId2"/>
+                <a:stretch>
+                  <a:fillRect l="-1132"/>
+                </a:stretch>
+              </a:blipFill>
+            </p:spPr>
+            <p:txBody>
+              <a:bodyPr/>
+              <a:lstStyle/>
+              <a:p>
+                <a:r>
+                  <a:rPr lang="pt-BR">
+                    <a:noFill/>
+                  </a:rPr>
+                  <a:t> </a:t>
+                </a:r>
+              </a:p>
+            </p:txBody>
+          </p:sp>
+        </mc:Fallback>
+      </mc:AlternateContent>
+    </p:spTree>
+    <p:extLst>
+      <p:ext uri="{BB962C8B-B14F-4D97-AF65-F5344CB8AC3E}">
+        <p14:creationId xmlns:p14="http://schemas.microsoft.com/office/powerpoint/2010/main" val="2260328864"/>
+      </p:ext>
+    </p:extLst>
+  </p:cSld>
+  <p:clrMapOvr>
+    <a:masterClrMapping/>
+  </p:clrMapOvr>
+</p:sld>
+</file>
+
+<file path=ppt/slides/slide12.xml><?xml version="1.0" encoding="utf-8"?>
+<p:sld xmlns:a="http://schemas.openxmlformats.org/drawingml/2006/main" xmlns:r="http://schemas.openxmlformats.org/officeDocument/2006/relationships" xmlns:p="http://schemas.openxmlformats.org/presentationml/2006/main">
+  <p:cSld>
+    <p:spTree>
+      <p:nvGrpSpPr>
+        <p:cNvPr id="1" name=""/>
+        <p:cNvGrpSpPr/>
+        <p:nvPr/>
+      </p:nvGrpSpPr>
+      <p:grpSpPr>
+        <a:xfrm>
+          <a:off x="0" y="0"/>
+          <a:ext cx="0" cy="0"/>
+          <a:chOff x="0" y="0"/>
+          <a:chExt cx="0" cy="0"/>
+        </a:xfrm>
+      </p:grpSpPr>
+      <p:sp>
+        <p:nvSpPr>
+          <p:cNvPr id="2" name="Título 1"/>
+          <p:cNvSpPr>
+            <a:spLocks noGrp="1"/>
+          </p:cNvSpPr>
+          <p:nvPr>
+            <p:ph type="title"/>
+          </p:nvPr>
+        </p:nvSpPr>
+        <p:spPr>
+          <a:xfrm>
+            <a:off x="755576" y="692696"/>
+            <a:ext cx="6781800" cy="1600200"/>
+          </a:xfrm>
+        </p:spPr>
+        <p:txBody>
+          <a:bodyPr/>
+          <a:lstStyle/>
+          <a:p>
+            <a:r>
+              <a:rPr lang="pt-BR" dirty="0">
+                <a:latin typeface="Baskerville Old Face" panose="02020602080505020303" pitchFamily="18" charset="0"/>
+              </a:rPr>
+              <a:t>EXEMPLOS</a:t>
+            </a:r>
+          </a:p>
+        </p:txBody>
+      </p:sp>
+      <mc:AlternateContent xmlns:mc="http://schemas.openxmlformats.org/markup-compatibility/2006">
+        <mc:Choice xmlns:a14="http://schemas.microsoft.com/office/drawing/2010/main" Requires="a14">
+          <p:sp>
+            <p:nvSpPr>
+              <p:cNvPr id="3" name="Espaço Reservado para Conteúdo 2"/>
+              <p:cNvSpPr>
+                <a:spLocks noGrp="1"/>
+              </p:cNvSpPr>
+              <p:nvPr>
+                <p:ph idx="1"/>
+              </p:nvPr>
+            </p:nvSpPr>
+            <p:spPr>
+              <a:xfrm>
+                <a:off x="755576" y="2292896"/>
+                <a:ext cx="7543800" cy="3310136"/>
+              </a:xfrm>
+            </p:spPr>
+            <p:txBody>
+              <a:bodyPr/>
+              <a:lstStyle/>
+              <a:p>
+                <a:r>
+                  <a:rPr lang="pt-BR" dirty="0" smtClean="0"/>
+                  <a:t>Exemplo 2</a:t>
+                </a:r>
+              </a:p>
+              <a:p>
+                <a:pPr lvl="1"/>
+                <a14:m>
+                  <m:oMath xmlns:m="http://schemas.openxmlformats.org/officeDocument/2006/math">
+                    <m:sSup>
+                      <m:sSupPr>
+                        <m:ctrlPr>
+                          <a:rPr lang="pt-BR" i="1">
+                            <a:latin typeface="Cambria Math" panose="02040503050406030204" pitchFamily="18" charset="0"/>
+                          </a:rPr>
+                        </m:ctrlPr>
+                      </m:sSupPr>
+                      <m:e>
+                        <m:r>
+                          <a:rPr lang="pt-BR" b="0" i="1" smtClean="0">
+                            <a:latin typeface="Cambria Math" panose="02040503050406030204" pitchFamily="18" charset="0"/>
+                          </a:rPr>
+                          <m:t>𝑥</m:t>
+                        </m:r>
+                      </m:e>
+                      <m:sup>
+                        <m:r>
+                          <a:rPr lang="pt-BR" i="1">
+                            <a:latin typeface="Cambria Math"/>
+                          </a:rPr>
+                          <m:t>4</m:t>
+                        </m:r>
+                      </m:sup>
+                    </m:sSup>
+                    <m:r>
+                      <a:rPr lang="pt-BR" b="0" i="1" smtClean="0">
+                        <a:latin typeface="Cambria Math" panose="02040503050406030204" pitchFamily="18" charset="0"/>
+                      </a:rPr>
+                      <m:t>−8</m:t>
+                    </m:r>
+                    <m:sSup>
+                      <m:sSupPr>
+                        <m:ctrlPr>
+                          <a:rPr lang="pt-BR" i="1">
+                            <a:latin typeface="Cambria Math" panose="02040503050406030204" pitchFamily="18" charset="0"/>
+                          </a:rPr>
+                        </m:ctrlPr>
+                      </m:sSupPr>
+                      <m:e>
+                        <m:r>
+                          <a:rPr lang="pt-BR" b="0" i="1" smtClean="0">
+                            <a:latin typeface="Cambria Math" panose="02040503050406030204" pitchFamily="18" charset="0"/>
+                          </a:rPr>
+                          <m:t>𝑥</m:t>
+                        </m:r>
+                      </m:e>
+                      <m:sup>
+                        <m:r>
+                          <a:rPr lang="pt-BR" i="1">
+                            <a:latin typeface="Cambria Math" panose="02040503050406030204" pitchFamily="18" charset="0"/>
+                          </a:rPr>
+                          <m:t>3</m:t>
+                        </m:r>
+                      </m:sup>
+                    </m:sSup>
+                    <m:r>
+                      <a:rPr lang="pt-BR" i="1">
+                        <a:latin typeface="Cambria Math" panose="02040503050406030204" pitchFamily="18" charset="0"/>
+                      </a:rPr>
+                      <m:t>+</m:t>
+                    </m:r>
+                    <m:r>
+                      <a:rPr lang="pt-BR" b="0" i="1" smtClean="0">
+                        <a:latin typeface="Cambria Math" panose="02040503050406030204" pitchFamily="18" charset="0"/>
+                      </a:rPr>
+                      <m:t>24</m:t>
+                    </m:r>
+                    <m:sSup>
+                      <m:sSupPr>
+                        <m:ctrlPr>
+                          <a:rPr lang="pt-BR" i="1">
+                            <a:latin typeface="Cambria Math" panose="02040503050406030204" pitchFamily="18" charset="0"/>
+                          </a:rPr>
+                        </m:ctrlPr>
+                      </m:sSupPr>
+                      <m:e>
+                        <m:r>
+                          <a:rPr lang="pt-BR" b="0" i="1" smtClean="0">
+                            <a:latin typeface="Cambria Math" panose="02040503050406030204" pitchFamily="18" charset="0"/>
+                          </a:rPr>
+                          <m:t>𝑥</m:t>
+                        </m:r>
+                      </m:e>
+                      <m:sup>
+                        <m:r>
+                          <a:rPr lang="pt-BR" i="1">
+                            <a:latin typeface="Cambria Math" panose="02040503050406030204" pitchFamily="18" charset="0"/>
+                          </a:rPr>
+                          <m:t>2</m:t>
+                        </m:r>
+                      </m:sup>
+                    </m:sSup>
+                    <m:r>
+                      <a:rPr lang="pt-BR" i="1" smtClean="0">
+                        <a:latin typeface="Cambria Math" panose="02040503050406030204" pitchFamily="18" charset="0"/>
+                      </a:rPr>
+                      <m:t>−</m:t>
+                    </m:r>
+                    <m:r>
+                      <a:rPr lang="pt-BR" b="0" i="1" smtClean="0">
+                        <a:latin typeface="Cambria Math" panose="02040503050406030204" pitchFamily="18" charset="0"/>
+                      </a:rPr>
+                      <m:t>32</m:t>
+                    </m:r>
+                    <m:sSup>
+                      <m:sSupPr>
+                        <m:ctrlPr>
+                          <a:rPr lang="pt-BR" i="1">
+                            <a:latin typeface="Cambria Math" panose="02040503050406030204" pitchFamily="18" charset="0"/>
+                          </a:rPr>
+                        </m:ctrlPr>
+                      </m:sSupPr>
+                      <m:e>
+                        <m:r>
+                          <a:rPr lang="pt-BR" b="0" i="1" smtClean="0">
+                            <a:latin typeface="Cambria Math" panose="02040503050406030204" pitchFamily="18" charset="0"/>
+                          </a:rPr>
+                          <m:t>𝑥</m:t>
+                        </m:r>
+                      </m:e>
+                      <m:sup>
+                        <m:r>
+                          <a:rPr lang="pt-BR" i="1">
+                            <a:latin typeface="Cambria Math" panose="02040503050406030204" pitchFamily="18" charset="0"/>
+                          </a:rPr>
+                          <m:t>1</m:t>
+                        </m:r>
+                      </m:sup>
+                    </m:sSup>
+                    <m:r>
+                      <a:rPr lang="pt-BR" b="0" i="1" smtClean="0">
+                        <a:latin typeface="Cambria Math" panose="02040503050406030204" pitchFamily="18" charset="0"/>
+                      </a:rPr>
+                      <m:t>+16</m:t>
+                    </m:r>
+                  </m:oMath>
+                </a14:m>
+                <a:endParaRPr lang="pt-BR" b="0" dirty="0" smtClean="0"/>
+              </a:p>
+              <a:p>
+                <a:pPr lvl="1"/>
+                <a:r>
+                  <a:rPr lang="pt-BR" dirty="0" smtClean="0"/>
+                  <a:t>Raiz: 2</a:t>
+                </a:r>
+              </a:p>
+              <a:p>
+                <a:pPr lvl="1"/>
+                <a:r>
+                  <a:rPr lang="pt-BR" dirty="0" smtClean="0"/>
+                  <a:t>Multiplicidade: 4</a:t>
+                </a:r>
+              </a:p>
+              <a:p>
+                <a:pPr lvl="1"/>
+                <a:r>
+                  <a:rPr lang="pt-BR" dirty="0" smtClean="0"/>
+                  <a:t>Newton-Raphson: 1 passo</a:t>
+                </a:r>
+              </a:p>
+              <a:p>
+                <a:pPr lvl="1"/>
+                <a:r>
+                  <a:rPr lang="pt-BR" dirty="0" smtClean="0"/>
+                  <a:t>Secante: 3 passos</a:t>
+                </a:r>
+                <a:endParaRPr lang="pt-BR" dirty="0"/>
+              </a:p>
+            </p:txBody>
+          </p:sp>
+        </mc:Choice>
+        <mc:Fallback>
+          <p:sp>
+            <p:nvSpPr>
+              <p:cNvPr id="3" name="Espaço Reservado para Conteúdo 2"/>
+              <p:cNvSpPr>
+                <a:spLocks noGrp="1" noRot="1" noChangeAspect="1" noMove="1" noResize="1" noEditPoints="1" noAdjustHandles="1" noChangeArrowheads="1" noChangeShapeType="1" noTextEdit="1"/>
+              </p:cNvSpPr>
+              <p:nvPr>
+                <p:ph idx="1"/>
+              </p:nvPr>
+            </p:nvSpPr>
+            <p:spPr>
+              <a:xfrm>
+                <a:off x="755576" y="2292896"/>
+                <a:ext cx="7543800" cy="3310136"/>
+              </a:xfrm>
+              <a:blipFill>
+                <a:blip r:embed="rId2"/>
+                <a:stretch>
+                  <a:fillRect l="-1132"/>
+                </a:stretch>
+              </a:blipFill>
+            </p:spPr>
+            <p:txBody>
+              <a:bodyPr/>
+              <a:lstStyle/>
+              <a:p>
+                <a:r>
+                  <a:rPr lang="pt-BR">
+                    <a:noFill/>
+                  </a:rPr>
+                  <a:t> </a:t>
+                </a:r>
+              </a:p>
+            </p:txBody>
+          </p:sp>
+        </mc:Fallback>
+      </mc:AlternateContent>
+    </p:spTree>
+    <p:extLst>
+      <p:ext uri="{BB962C8B-B14F-4D97-AF65-F5344CB8AC3E}">
+        <p14:creationId xmlns:p14="http://schemas.microsoft.com/office/powerpoint/2010/main" val="2092734858"/>
+      </p:ext>
+    </p:extLst>
+  </p:cSld>
+  <p:clrMapOvr>
+    <a:masterClrMapping/>
+  </p:clrMapOvr>
+</p:sld>
+</file>
+
+<file path=ppt/slides/slide13.xml><?xml version="1.0" encoding="utf-8"?>
+<p:sld xmlns:a="http://schemas.openxmlformats.org/drawingml/2006/main" xmlns:r="http://schemas.openxmlformats.org/officeDocument/2006/relationships" xmlns:p="http://schemas.openxmlformats.org/presentationml/2006/main">
+  <p:cSld>
+    <p:spTree>
+      <p:nvGrpSpPr>
+        <p:cNvPr id="1" name=""/>
+        <p:cNvGrpSpPr/>
+        <p:nvPr/>
+      </p:nvGrpSpPr>
+      <p:grpSpPr>
+        <a:xfrm>
+          <a:off x="0" y="0"/>
+          <a:ext cx="0" cy="0"/>
+          <a:chOff x="0" y="0"/>
+          <a:chExt cx="0" cy="0"/>
+        </a:xfrm>
+      </p:grpSpPr>
+      <p:sp>
+        <p:nvSpPr>
+          <p:cNvPr id="2" name="Título 1"/>
+          <p:cNvSpPr>
+            <a:spLocks noGrp="1"/>
+          </p:cNvSpPr>
+          <p:nvPr>
+            <p:ph type="title"/>
+          </p:nvPr>
+        </p:nvSpPr>
+        <p:spPr>
+          <a:xfrm>
+            <a:off x="755576" y="692696"/>
+            <a:ext cx="6781800" cy="1600200"/>
+          </a:xfrm>
+        </p:spPr>
+        <p:txBody>
+          <a:bodyPr/>
+          <a:lstStyle/>
+          <a:p>
+            <a:r>
+              <a:rPr lang="pt-BR" dirty="0">
+                <a:latin typeface="Baskerville Old Face" panose="02020602080505020303" pitchFamily="18" charset="0"/>
+              </a:rPr>
+              <a:t>EXEMPLOS</a:t>
+            </a:r>
+          </a:p>
+        </p:txBody>
+      </p:sp>
+      <mc:AlternateContent xmlns:mc="http://schemas.openxmlformats.org/markup-compatibility/2006">
+        <mc:Choice xmlns:a14="http://schemas.microsoft.com/office/drawing/2010/main" Requires="a14">
+          <p:sp>
+            <p:nvSpPr>
+              <p:cNvPr id="3" name="Espaço Reservado para Conteúdo 2"/>
+              <p:cNvSpPr>
+                <a:spLocks noGrp="1"/>
+              </p:cNvSpPr>
+              <p:nvPr>
+                <p:ph idx="1"/>
+              </p:nvPr>
+            </p:nvSpPr>
+            <p:spPr>
+              <a:xfrm>
+                <a:off x="755576" y="2292896"/>
+                <a:ext cx="7543800" cy="3310136"/>
+              </a:xfrm>
+            </p:spPr>
+            <p:txBody>
+              <a:bodyPr/>
+              <a:lstStyle/>
+              <a:p>
+                <a:r>
+                  <a:rPr lang="pt-BR" dirty="0" smtClean="0"/>
+                  <a:t>Exemplo 3</a:t>
+                </a:r>
+              </a:p>
+              <a:p>
+                <a:pPr lvl="1"/>
+                <a14:m>
+                  <m:oMath xmlns:m="http://schemas.openxmlformats.org/officeDocument/2006/math">
+                    <m:sSup>
+                      <m:sSupPr>
+                        <m:ctrlPr>
+                          <a:rPr lang="pt-BR" i="1">
+                            <a:latin typeface="Cambria Math" panose="02040503050406030204" pitchFamily="18" charset="0"/>
+                          </a:rPr>
+                        </m:ctrlPr>
+                      </m:sSupPr>
+                      <m:e>
+                        <m:r>
+                          <a:rPr lang="pt-BR" b="0" i="1" smtClean="0">
+                            <a:latin typeface="Cambria Math" panose="02040503050406030204" pitchFamily="18" charset="0"/>
+                          </a:rPr>
+                          <m:t>𝑥</m:t>
+                        </m:r>
+                      </m:e>
+                      <m:sup>
+                        <m:r>
+                          <a:rPr lang="pt-BR" i="1">
+                            <a:latin typeface="Cambria Math"/>
+                          </a:rPr>
+                          <m:t>4</m:t>
+                        </m:r>
+                      </m:sup>
+                    </m:sSup>
+                    <m:r>
+                      <a:rPr lang="pt-BR" b="0" i="1" smtClean="0">
+                        <a:latin typeface="Cambria Math" panose="02040503050406030204" pitchFamily="18" charset="0"/>
+                      </a:rPr>
+                      <m:t>+</m:t>
+                    </m:r>
+                    <m:sSup>
+                      <m:sSupPr>
+                        <m:ctrlPr>
+                          <a:rPr lang="pt-BR" i="1" smtClean="0">
+                            <a:latin typeface="Cambria Math" panose="02040503050406030204" pitchFamily="18" charset="0"/>
+                          </a:rPr>
+                        </m:ctrlPr>
+                      </m:sSupPr>
+                      <m:e>
+                        <m:r>
+                          <a:rPr lang="pt-BR" b="0" i="1" smtClean="0">
+                            <a:latin typeface="Cambria Math" panose="02040503050406030204" pitchFamily="18" charset="0"/>
+                          </a:rPr>
+                          <m:t>𝑥</m:t>
+                        </m:r>
+                      </m:e>
+                      <m:sup>
+                        <m:r>
+                          <a:rPr lang="pt-BR" i="1">
+                            <a:latin typeface="Cambria Math" panose="02040503050406030204" pitchFamily="18" charset="0"/>
+                          </a:rPr>
+                          <m:t>3</m:t>
+                        </m:r>
+                      </m:sup>
+                    </m:sSup>
+                    <m:r>
+                      <a:rPr lang="pt-BR" i="1" smtClean="0">
+                        <a:latin typeface="Cambria Math" panose="02040503050406030204" pitchFamily="18" charset="0"/>
+                      </a:rPr>
+                      <m:t>−</m:t>
+                    </m:r>
+                    <m:r>
+                      <a:rPr lang="pt-BR" b="0" i="1" smtClean="0">
+                        <a:latin typeface="Cambria Math" panose="02040503050406030204" pitchFamily="18" charset="0"/>
+                      </a:rPr>
+                      <m:t>51</m:t>
+                    </m:r>
+                    <m:sSup>
+                      <m:sSupPr>
+                        <m:ctrlPr>
+                          <a:rPr lang="pt-BR" i="1">
+                            <a:latin typeface="Cambria Math" panose="02040503050406030204" pitchFamily="18" charset="0"/>
+                          </a:rPr>
+                        </m:ctrlPr>
+                      </m:sSupPr>
+                      <m:e>
+                        <m:r>
+                          <a:rPr lang="pt-BR" b="0" i="1" smtClean="0">
+                            <a:latin typeface="Cambria Math" panose="02040503050406030204" pitchFamily="18" charset="0"/>
+                          </a:rPr>
+                          <m:t>𝑥</m:t>
+                        </m:r>
+                      </m:e>
+                      <m:sup>
+                        <m:r>
+                          <a:rPr lang="pt-BR" i="1">
+                            <a:latin typeface="Cambria Math" panose="02040503050406030204" pitchFamily="18" charset="0"/>
+                          </a:rPr>
+                          <m:t>2</m:t>
+                        </m:r>
+                      </m:sup>
+                    </m:sSup>
+                    <m:r>
+                      <a:rPr lang="pt-BR" i="1" smtClean="0">
+                        <a:latin typeface="Cambria Math" panose="02040503050406030204" pitchFamily="18" charset="0"/>
+                      </a:rPr>
+                      <m:t>−</m:t>
+                    </m:r>
+                    <m:r>
+                      <a:rPr lang="pt-BR" b="0" i="1" smtClean="0">
+                        <a:latin typeface="Cambria Math" panose="02040503050406030204" pitchFamily="18" charset="0"/>
+                      </a:rPr>
+                      <m:t>85</m:t>
+                    </m:r>
+                    <m:sSup>
+                      <m:sSupPr>
+                        <m:ctrlPr>
+                          <a:rPr lang="pt-BR" i="1">
+                            <a:latin typeface="Cambria Math" panose="02040503050406030204" pitchFamily="18" charset="0"/>
+                          </a:rPr>
+                        </m:ctrlPr>
+                      </m:sSupPr>
+                      <m:e>
+                        <m:r>
+                          <a:rPr lang="pt-BR" b="0" i="1" smtClean="0">
+                            <a:latin typeface="Cambria Math" panose="02040503050406030204" pitchFamily="18" charset="0"/>
+                          </a:rPr>
+                          <m:t>𝑥</m:t>
+                        </m:r>
+                      </m:e>
+                      <m:sup>
+                        <m:r>
+                          <a:rPr lang="pt-BR" i="1">
+                            <a:latin typeface="Cambria Math" panose="02040503050406030204" pitchFamily="18" charset="0"/>
+                          </a:rPr>
+                          <m:t>1</m:t>
+                        </m:r>
+                      </m:sup>
+                    </m:sSup>
+                    <m:r>
+                      <a:rPr lang="pt-BR" b="0" i="1" smtClean="0">
+                        <a:latin typeface="Cambria Math" panose="02040503050406030204" pitchFamily="18" charset="0"/>
+                      </a:rPr>
+                      <m:t>+350</m:t>
+                    </m:r>
+                  </m:oMath>
+                </a14:m>
+                <a:endParaRPr lang="pt-BR" b="0" dirty="0" smtClean="0"/>
+              </a:p>
+              <a:p>
+                <a:pPr lvl="1"/>
+                <a:r>
+                  <a:rPr lang="pt-BR" dirty="0" smtClean="0"/>
+                  <a:t>Raiz: -5</a:t>
+                </a:r>
+              </a:p>
+              <a:p>
+                <a:pPr lvl="1"/>
+                <a:r>
+                  <a:rPr lang="pt-BR" dirty="0" smtClean="0"/>
+                  <a:t>Multiplicidade: 2</a:t>
+                </a:r>
+              </a:p>
+              <a:p>
+                <a:pPr lvl="1"/>
+                <a:r>
+                  <a:rPr lang="pt-BR" dirty="0" smtClean="0"/>
+                  <a:t>Newton-Raphson: 9 passos</a:t>
+                </a:r>
+              </a:p>
+              <a:p>
+                <a:pPr lvl="1"/>
+                <a:r>
+                  <a:rPr lang="pt-BR" dirty="0" smtClean="0"/>
+                  <a:t>Secante: 19 passos</a:t>
+                </a:r>
+                <a:endParaRPr lang="pt-BR" dirty="0"/>
+              </a:p>
+            </p:txBody>
+          </p:sp>
+        </mc:Choice>
+        <mc:Fallback>
+          <p:sp>
+            <p:nvSpPr>
+              <p:cNvPr id="3" name="Espaço Reservado para Conteúdo 2"/>
+              <p:cNvSpPr>
+                <a:spLocks noGrp="1" noRot="1" noChangeAspect="1" noMove="1" noResize="1" noEditPoints="1" noAdjustHandles="1" noChangeArrowheads="1" noChangeShapeType="1" noTextEdit="1"/>
+              </p:cNvSpPr>
+              <p:nvPr>
+                <p:ph idx="1"/>
+              </p:nvPr>
+            </p:nvSpPr>
+            <p:spPr>
+              <a:xfrm>
+                <a:off x="755576" y="2292896"/>
+                <a:ext cx="7543800" cy="3310136"/>
+              </a:xfrm>
+              <a:blipFill>
+                <a:blip r:embed="rId2"/>
+                <a:stretch>
+                  <a:fillRect l="-1132"/>
+                </a:stretch>
+              </a:blipFill>
+            </p:spPr>
+            <p:txBody>
+              <a:bodyPr/>
+              <a:lstStyle/>
+              <a:p>
+                <a:r>
+                  <a:rPr lang="pt-BR">
+                    <a:noFill/>
+                  </a:rPr>
+                  <a:t> </a:t>
+                </a:r>
+              </a:p>
+            </p:txBody>
+          </p:sp>
+        </mc:Fallback>
+      </mc:AlternateContent>
+    </p:spTree>
+    <p:extLst>
+      <p:ext uri="{BB962C8B-B14F-4D97-AF65-F5344CB8AC3E}">
+        <p14:creationId xmlns:p14="http://schemas.microsoft.com/office/powerpoint/2010/main" val="3050897967"/>
+      </p:ext>
+    </p:extLst>
+  </p:cSld>
+  <p:clrMapOvr>
+    <a:masterClrMapping/>
+  </p:clrMapOvr>
+</p:sld>
+</file>
+
+<file path=ppt/slides/slide14.xml><?xml version="1.0" encoding="utf-8"?>
+<p:sld xmlns:a="http://schemas.openxmlformats.org/drawingml/2006/main" xmlns:r="http://schemas.openxmlformats.org/officeDocument/2006/relationships" xmlns:p="http://schemas.openxmlformats.org/presentationml/2006/main">
+  <p:cSld>
+    <p:spTree>
+      <p:nvGrpSpPr>
+        <p:cNvPr id="1" name=""/>
+        <p:cNvGrpSpPr/>
+        <p:nvPr/>
+      </p:nvGrpSpPr>
+      <p:grpSpPr>
+        <a:xfrm>
+          <a:off x="0" y="0"/>
+          <a:ext cx="0" cy="0"/>
+          <a:chOff x="0" y="0"/>
+          <a:chExt cx="0" cy="0"/>
+        </a:xfrm>
+      </p:grpSpPr>
+      <p:sp>
+        <p:nvSpPr>
+          <p:cNvPr id="2" name="Título 1"/>
+          <p:cNvSpPr>
+            <a:spLocks noGrp="1"/>
+          </p:cNvSpPr>
+          <p:nvPr>
+            <p:ph type="title"/>
+          </p:nvPr>
+        </p:nvSpPr>
+        <p:spPr>
+          <a:xfrm>
+            <a:off x="755576" y="692696"/>
+            <a:ext cx="6781800" cy="1600200"/>
+          </a:xfrm>
+        </p:spPr>
+        <p:txBody>
+          <a:bodyPr/>
+          <a:lstStyle/>
+          <a:p>
+            <a:r>
+              <a:rPr lang="pt-BR" dirty="0">
+                <a:latin typeface="Baskerville Old Face" panose="02020602080505020303" pitchFamily="18" charset="0"/>
+              </a:rPr>
               <a:t>CONCLUSÃO</a:t>
             </a:r>
           </a:p>
@@ -3754,7 +5181,32 @@
           <a:bodyPr/>
           <a:lstStyle/>
           <a:p>
-            <a:endParaRPr lang="pt-BR" u="sng" dirty="0"/>
+            <a:r>
+              <a:rPr lang="pt-BR" u="sng" dirty="0" smtClean="0"/>
+              <a:t>Para polinômios:</a:t>
+            </a:r>
+          </a:p>
+          <a:p>
+            <a:pPr lvl="1"/>
+            <a:r>
+              <a:rPr lang="pt-BR" u="sng" dirty="0" smtClean="0"/>
+              <a:t>O método de Newton-Raphson converge em menos passos</a:t>
+            </a:r>
+          </a:p>
+          <a:p>
+            <a:pPr lvl="1"/>
+            <a:r>
+              <a:rPr lang="pt-BR" u="sng" dirty="0" smtClean="0"/>
+              <a:t>O método de Horner permite cálculo da derivada com insignificante perda de rendimento </a:t>
+            </a:r>
+            <a:endParaRPr lang="pt-BR" u="sng" dirty="0" smtClean="0"/>
+          </a:p>
+          <a:p>
+            <a:pPr lvl="1"/>
+            <a:r>
+              <a:rPr lang="pt-BR" u="sng" dirty="0" smtClean="0"/>
+              <a:t>O método da Secante por precisar de dois chutes iniciais é mais problemático para convergir</a:t>
+            </a:r>
           </a:p>
         </p:txBody>
       </p:sp>
@@ -4002,8 +5454,8 @@
           <a:chExt cx="0" cy="0"/>
         </a:xfrm>
       </p:grpSpPr>
-      <mc:AlternateContent xmlns:mc="http://schemas.openxmlformats.org/markup-compatibility/2006" xmlns:a14="http://schemas.microsoft.com/office/drawing/2010/main">
-        <mc:Choice Requires="a14">
+      <mc:AlternateContent xmlns:mc="http://schemas.openxmlformats.org/markup-compatibility/2006">
+        <mc:Choice xmlns:a14="http://schemas.microsoft.com/office/drawing/2010/main" Requires="a14">
           <p:sp>
             <p:nvSpPr>
               <p:cNvPr id="3" name="Espaço Reservado para Conteúdo 2"/>
@@ -4028,7 +5480,7 @@
                   <a:buNone/>
                 </a:pPr>
                 <a:r>
-                  <a:rPr lang="pt-BR" dirty="0"/>
+                  <a:rPr lang="pt-BR" dirty="0" smtClean="0"/>
                   <a:t>A quantidade </a:t>
                 </a:r>
                 <a:r>
@@ -4133,8 +5585,201 @@
                         <a:rPr lang="pt-BR" i="1">
                           <a:latin typeface="Cambria Math"/>
                         </a:rPr>
-                        <m:t>+ </m:t>
+                        <m:t>+</m:t>
                       </m:r>
+                      <m:sSub>
+                        <m:sSubPr>
+                          <m:ctrlPr>
+                            <a:rPr lang="pt-BR" i="1">
+                              <a:latin typeface="Cambria Math" panose="02040503050406030204" pitchFamily="18" charset="0"/>
+                            </a:rPr>
+                          </m:ctrlPr>
+                        </m:sSubPr>
+                        <m:e>
+                          <m:r>
+                            <a:rPr lang="pt-BR" i="1">
+                              <a:latin typeface="Cambria Math"/>
+                            </a:rPr>
+                            <m:t>𝑎</m:t>
+                          </m:r>
+                        </m:e>
+                        <m:sub>
+                          <m:r>
+                            <a:rPr lang="pt-BR" b="0" i="1" smtClean="0">
+                              <a:latin typeface="Cambria Math" panose="02040503050406030204" pitchFamily="18" charset="0"/>
+                            </a:rPr>
+                            <m:t>3</m:t>
+                          </m:r>
+                        </m:sub>
+                      </m:sSub>
+                      <m:sSup>
+                        <m:sSupPr>
+                          <m:ctrlPr>
+                            <a:rPr lang="pt-BR" i="1">
+                              <a:latin typeface="Cambria Math" panose="02040503050406030204" pitchFamily="18" charset="0"/>
+                            </a:rPr>
+                          </m:ctrlPr>
+                        </m:sSupPr>
+                        <m:e>
+                          <m:r>
+                            <a:rPr lang="pt-BR" i="1">
+                              <a:latin typeface="Cambria Math"/>
+                            </a:rPr>
+                            <m:t>𝑐</m:t>
+                          </m:r>
+                        </m:e>
+                        <m:sup>
+                          <m:r>
+                            <a:rPr lang="pt-BR" b="0" i="1" smtClean="0">
+                              <a:latin typeface="Cambria Math" panose="02040503050406030204" pitchFamily="18" charset="0"/>
+                            </a:rPr>
+                            <m:t>3</m:t>
+                          </m:r>
+                        </m:sup>
+                      </m:sSup>
+                      <m:r>
+                        <a:rPr lang="pt-BR" b="0" i="1" smtClean="0">
+                          <a:latin typeface="Cambria Math" panose="02040503050406030204" pitchFamily="18" charset="0"/>
+                        </a:rPr>
+                        <m:t>+</m:t>
+                      </m:r>
+                      <m:sSub>
+                        <m:sSubPr>
+                          <m:ctrlPr>
+                            <a:rPr lang="pt-BR" i="1">
+                              <a:latin typeface="Cambria Math" panose="02040503050406030204" pitchFamily="18" charset="0"/>
+                            </a:rPr>
+                          </m:ctrlPr>
+                        </m:sSubPr>
+                        <m:e>
+                          <m:r>
+                            <a:rPr lang="pt-BR" i="1">
+                              <a:latin typeface="Cambria Math"/>
+                            </a:rPr>
+                            <m:t>𝑎</m:t>
+                          </m:r>
+                        </m:e>
+                        <m:sub>
+                          <m:r>
+                            <a:rPr lang="pt-BR" b="0" i="1" smtClean="0">
+                              <a:latin typeface="Cambria Math" panose="02040503050406030204" pitchFamily="18" charset="0"/>
+                            </a:rPr>
+                            <m:t>2</m:t>
+                          </m:r>
+                        </m:sub>
+                      </m:sSub>
+                      <m:sSup>
+                        <m:sSupPr>
+                          <m:ctrlPr>
+                            <a:rPr lang="pt-BR" i="1">
+                              <a:latin typeface="Cambria Math" panose="02040503050406030204" pitchFamily="18" charset="0"/>
+                            </a:rPr>
+                          </m:ctrlPr>
+                        </m:sSupPr>
+                        <m:e>
+                          <m:r>
+                            <a:rPr lang="pt-BR" i="1">
+                              <a:latin typeface="Cambria Math"/>
+                            </a:rPr>
+                            <m:t>𝑐</m:t>
+                          </m:r>
+                        </m:e>
+                        <m:sup>
+                          <m:r>
+                            <a:rPr lang="pt-BR" b="0" i="1" smtClean="0">
+                              <a:latin typeface="Cambria Math" panose="02040503050406030204" pitchFamily="18" charset="0"/>
+                            </a:rPr>
+                            <m:t>2</m:t>
+                          </m:r>
+                        </m:sup>
+                      </m:sSup>
+                      <m:r>
+                        <a:rPr lang="pt-BR" i="1">
+                          <a:latin typeface="Cambria Math" panose="02040503050406030204" pitchFamily="18" charset="0"/>
+                        </a:rPr>
+                        <m:t>+</m:t>
+                      </m:r>
+                      <m:sSub>
+                        <m:sSubPr>
+                          <m:ctrlPr>
+                            <a:rPr lang="pt-BR" i="1">
+                              <a:latin typeface="Cambria Math" panose="02040503050406030204" pitchFamily="18" charset="0"/>
+                            </a:rPr>
+                          </m:ctrlPr>
+                        </m:sSubPr>
+                        <m:e>
+                          <m:r>
+                            <a:rPr lang="pt-BR" i="1">
+                              <a:latin typeface="Cambria Math"/>
+                            </a:rPr>
+                            <m:t>𝑎</m:t>
+                          </m:r>
+                        </m:e>
+                        <m:sub>
+                          <m:r>
+                            <a:rPr lang="pt-BR" b="0" i="1" smtClean="0">
+                              <a:latin typeface="Cambria Math" panose="02040503050406030204" pitchFamily="18" charset="0"/>
+                            </a:rPr>
+                            <m:t>1</m:t>
+                          </m:r>
+                        </m:sub>
+                      </m:sSub>
+                      <m:sSup>
+                        <m:sSupPr>
+                          <m:ctrlPr>
+                            <a:rPr lang="pt-BR" i="1">
+                              <a:latin typeface="Cambria Math" panose="02040503050406030204" pitchFamily="18" charset="0"/>
+                            </a:rPr>
+                          </m:ctrlPr>
+                        </m:sSupPr>
+                        <m:e>
+                          <m:r>
+                            <a:rPr lang="pt-BR" i="1">
+                              <a:latin typeface="Cambria Math"/>
+                            </a:rPr>
+                            <m:t>𝑐</m:t>
+                          </m:r>
+                        </m:e>
+                        <m:sup>
+                          <m:r>
+                            <a:rPr lang="pt-BR" b="0" i="1" smtClean="0">
+                              <a:latin typeface="Cambria Math" panose="02040503050406030204" pitchFamily="18" charset="0"/>
+                            </a:rPr>
+                            <m:t>1</m:t>
+                          </m:r>
+                        </m:sup>
+                      </m:sSup>
+                      <m:r>
+                        <a:rPr lang="pt-BR" i="1">
+                          <a:latin typeface="Cambria Math" panose="02040503050406030204" pitchFamily="18" charset="0"/>
+                        </a:rPr>
+                        <m:t>+</m:t>
+                      </m:r>
+                      <m:sSub>
+                        <m:sSubPr>
+                          <m:ctrlPr>
+                            <a:rPr lang="pt-BR" i="1">
+                              <a:latin typeface="Cambria Math" panose="02040503050406030204" pitchFamily="18" charset="0"/>
+                            </a:rPr>
+                          </m:ctrlPr>
+                        </m:sSubPr>
+                        <m:e>
+                          <m:r>
+                            <a:rPr lang="pt-BR" i="1">
+                              <a:latin typeface="Cambria Math"/>
+                            </a:rPr>
+                            <m:t>𝑎</m:t>
+                          </m:r>
+                        </m:e>
+                        <m:sub>
+                          <m:r>
+                            <a:rPr lang="pt-BR" b="0" i="1" smtClean="0">
+                              <a:latin typeface="Cambria Math" panose="02040503050406030204" pitchFamily="18" charset="0"/>
+                            </a:rPr>
+                            <m:t>0</m:t>
+                          </m:r>
+                        </m:sub>
+                      </m:sSub>
                     </m:oMath>
                   </m:oMathPara>
                 </a14:m>
@@ -4146,7 +5791,7 @@
             </p:txBody>
           </p:sp>
         </mc:Choice>
-        <mc:Fallback xmlns="">
+        <mc:Fallback>
           <p:sp>
             <p:nvSpPr>
               <p:cNvPr id="3" name="Espaço Reservado para Conteúdo 2"/>
@@ -4162,7 +5807,7 @@
                 <a:off x="755576" y="1988840"/>
                 <a:ext cx="7543800" cy="2520280"/>
               </a:xfrm>
-              <a:blipFill rotWithShape="1">
+              <a:blipFill>
                 <a:blip r:embed="rId2"/>
                 <a:stretch>
                   <a:fillRect/>
@@ -5118,30 +6763,401 @@
           </a:p>
         </p:txBody>
       </p:sp>
-      <p:sp>
-        <p:nvSpPr>
-          <p:cNvPr id="3" name="Espaço Reservado para Conteúdo 2"/>
-          <p:cNvSpPr>
-            <a:spLocks noGrp="1"/>
-          </p:cNvSpPr>
+      <p:graphicFrame>
+        <p:nvGraphicFramePr>
+          <p:cNvPr id="5" name="Content Placeholder 4"/>
+          <p:cNvGraphicFramePr>
+            <a:graphicFrameLocks noGrp="1"/>
+          </p:cNvGraphicFramePr>
           <p:nvPr>
             <p:ph idx="1"/>
-          </p:nvPr>
+            <p:extLst>
+              <p:ext uri="{D42A27DB-BD31-4B8C-83A1-F6EECF244321}">
+                <p14:modId xmlns:p14="http://schemas.microsoft.com/office/powerpoint/2010/main" val="1440790591"/>
+              </p:ext>
+            </p:extLst>
+          </p:nvPr>
+        </p:nvGraphicFramePr>
+        <p:xfrm>
+          <a:off x="759586" y="4099371"/>
+          <a:ext cx="7543800" cy="1188720"/>
+        </p:xfrm>
+        <a:graphic>
+          <a:graphicData uri="http://schemas.openxmlformats.org/drawingml/2006/table">
+            <a:tbl>
+              <a:tblPr/>
+              <a:tblGrid>
+                <a:gridCol w="7543800">
+                  <a:extLst>
+                    <a:ext uri="{9D8B030D-6E8A-4147-A177-3AD203B41FA5}">
+                      <a16:colId xmlns:a16="http://schemas.microsoft.com/office/drawing/2014/main" val="2942055312"/>
+                    </a:ext>
+                  </a:extLst>
+                </a:gridCol>
+              </a:tblGrid>
+              <a:tr h="0">
+                <a:tc>
+                  <a:txBody>
+                    <a:bodyPr/>
+                    <a:lstStyle/>
+                    <a:p>
+                      <a:pPr fontAlgn="t"/>
+                      <a:r>
+                        <a:rPr lang="pt-BR" dirty="0">
+                          <a:solidFill>
+                            <a:srgbClr val="333333"/>
+                          </a:solidFill>
+                          <a:effectLst/>
+                          <a:latin typeface="Consolas" panose="020B0609020204030204" pitchFamily="49" charset="0"/>
+                        </a:rPr>
+                        <a:t/>
+                      </a:r>
+                      <a:br>
+                        <a:rPr lang="pt-BR" dirty="0">
+                          <a:solidFill>
+                            <a:srgbClr val="333333"/>
+                          </a:solidFill>
+                          <a:effectLst/>
+                          <a:latin typeface="Consolas" panose="020B0609020204030204" pitchFamily="49" charset="0"/>
+                        </a:rPr>
+                      </a:br>
+                      <a:r>
+                        <a:rPr lang="pt-BR" dirty="0">
+                          <a:solidFill>
+                            <a:srgbClr val="333333"/>
+                          </a:solidFill>
+                          <a:effectLst/>
+                          <a:latin typeface="Consolas" panose="020B0609020204030204" pitchFamily="49" charset="0"/>
+                        </a:rPr>
+                        <a:t>std::vector&lt;std::vector&lt;</a:t>
+                      </a:r>
+                      <a:r>
+                        <a:rPr lang="pt-BR" dirty="0">
+                          <a:solidFill>
+                            <a:srgbClr val="A71D5D"/>
+                          </a:solidFill>
+                          <a:effectLst/>
+                          <a:latin typeface="Consolas" panose="020B0609020204030204" pitchFamily="49" charset="0"/>
+                        </a:rPr>
+                        <a:t>double</a:t>
+                      </a:r>
+                      <a:r>
+                        <a:rPr lang="pt-BR" dirty="0">
+                          <a:solidFill>
+                            <a:srgbClr val="333333"/>
+                          </a:solidFill>
+                          <a:effectLst/>
+                          <a:latin typeface="Consolas" panose="020B0609020204030204" pitchFamily="49" charset="0"/>
+                        </a:rPr>
+                        <a:t>&gt; &gt; </a:t>
+                      </a:r>
+                      <a:r>
+                        <a:rPr lang="pt-BR" dirty="0">
+                          <a:solidFill>
+                            <a:srgbClr val="795DA3"/>
+                          </a:solidFill>
+                          <a:effectLst/>
+                          <a:latin typeface="Consolas" panose="020B0609020204030204" pitchFamily="49" charset="0"/>
+                        </a:rPr>
+                        <a:t>Newton::calcularRaiz</a:t>
+                      </a:r>
+                      <a:r>
+                        <a:rPr lang="pt-BR" dirty="0">
+                          <a:solidFill>
+                            <a:srgbClr val="333333"/>
+                          </a:solidFill>
+                          <a:effectLst/>
+                          <a:latin typeface="Consolas" panose="020B0609020204030204" pitchFamily="49" charset="0"/>
+                        </a:rPr>
+                        <a:t>(</a:t>
+                      </a:r>
+                      <a:r>
+                        <a:rPr lang="pt-BR" dirty="0">
+                          <a:solidFill>
+                            <a:srgbClr val="A71D5D"/>
+                          </a:solidFill>
+                          <a:effectLst/>
+                          <a:latin typeface="Consolas" panose="020B0609020204030204" pitchFamily="49" charset="0"/>
+                        </a:rPr>
+                        <a:t>double</a:t>
+                      </a:r>
+                      <a:r>
+                        <a:rPr lang="pt-BR" dirty="0">
+                          <a:solidFill>
+                            <a:srgbClr val="333333"/>
+                          </a:solidFill>
+                          <a:effectLst/>
+                          <a:latin typeface="Consolas" panose="020B0609020204030204" pitchFamily="49" charset="0"/>
+                        </a:rPr>
+                        <a:t> x, std::vector&lt;</a:t>
+                      </a:r>
+                      <a:r>
+                        <a:rPr lang="pt-BR" dirty="0">
+                          <a:solidFill>
+                            <a:srgbClr val="A71D5D"/>
+                          </a:solidFill>
+                          <a:effectLst/>
+                          <a:latin typeface="Consolas" panose="020B0609020204030204" pitchFamily="49" charset="0"/>
+                        </a:rPr>
+                        <a:t>double</a:t>
+                      </a:r>
+                      <a:r>
+                        <a:rPr lang="pt-BR" dirty="0">
+                          <a:solidFill>
+                            <a:srgbClr val="333333"/>
+                          </a:solidFill>
+                          <a:effectLst/>
+                          <a:latin typeface="Consolas" panose="020B0609020204030204" pitchFamily="49" charset="0"/>
+                        </a:rPr>
+                        <a:t>&gt; a, </a:t>
+                      </a:r>
+                      <a:r>
+                        <a:rPr lang="pt-BR" dirty="0">
+                          <a:solidFill>
+                            <a:srgbClr val="A71D5D"/>
+                          </a:solidFill>
+                          <a:effectLst/>
+                          <a:latin typeface="Consolas" panose="020B0609020204030204" pitchFamily="49" charset="0"/>
+                        </a:rPr>
+                        <a:t>double</a:t>
+                      </a:r>
+                      <a:r>
+                        <a:rPr lang="pt-BR" dirty="0">
+                          <a:solidFill>
+                            <a:srgbClr val="333333"/>
+                          </a:solidFill>
+                          <a:effectLst/>
+                          <a:latin typeface="Consolas" panose="020B0609020204030204" pitchFamily="49" charset="0"/>
+                        </a:rPr>
+                        <a:t> </a:t>
+                      </a:r>
+                      <a:r>
+                        <a:rPr lang="pt-BR" dirty="0">
+                          <a:solidFill>
+                            <a:srgbClr val="0086B3"/>
+                          </a:solidFill>
+                          <a:effectLst/>
+                          <a:latin typeface="Consolas" panose="020B0609020204030204" pitchFamily="49" charset="0"/>
+                        </a:rPr>
+                        <a:t>e1</a:t>
+                      </a:r>
+                      <a:r>
+                        <a:rPr lang="pt-BR" dirty="0">
+                          <a:solidFill>
+                            <a:srgbClr val="333333"/>
+                          </a:solidFill>
+                          <a:effectLst/>
+                          <a:latin typeface="Consolas" panose="020B0609020204030204" pitchFamily="49" charset="0"/>
+                        </a:rPr>
+                        <a:t>, </a:t>
+                      </a:r>
+                      <a:r>
+                        <a:rPr lang="pt-BR" dirty="0">
+                          <a:solidFill>
+                            <a:srgbClr val="A71D5D"/>
+                          </a:solidFill>
+                          <a:effectLst/>
+                          <a:latin typeface="Consolas" panose="020B0609020204030204" pitchFamily="49" charset="0"/>
+                        </a:rPr>
+                        <a:t>double</a:t>
+                      </a:r>
+                      <a:r>
+                        <a:rPr lang="pt-BR" dirty="0">
+                          <a:solidFill>
+                            <a:srgbClr val="333333"/>
+                          </a:solidFill>
+                          <a:effectLst/>
+                          <a:latin typeface="Consolas" panose="020B0609020204030204" pitchFamily="49" charset="0"/>
+                        </a:rPr>
+                        <a:t> </a:t>
+                      </a:r>
+                      <a:r>
+                        <a:rPr lang="pt-BR" dirty="0">
+                          <a:solidFill>
+                            <a:srgbClr val="0086B3"/>
+                          </a:solidFill>
+                          <a:effectLst/>
+                          <a:latin typeface="Consolas" panose="020B0609020204030204" pitchFamily="49" charset="0"/>
+                        </a:rPr>
+                        <a:t>e2</a:t>
+                      </a:r>
+                      <a:r>
+                        <a:rPr lang="pt-BR" dirty="0">
+                          <a:solidFill>
+                            <a:srgbClr val="333333"/>
+                          </a:solidFill>
+                          <a:effectLst/>
+                          <a:latin typeface="Consolas" panose="020B0609020204030204" pitchFamily="49" charset="0"/>
+                        </a:rPr>
+                        <a:t>, </a:t>
+                      </a:r>
+                      <a:r>
+                        <a:rPr lang="pt-BR" dirty="0">
+                          <a:solidFill>
+                            <a:srgbClr val="A71D5D"/>
+                          </a:solidFill>
+                          <a:effectLst/>
+                          <a:latin typeface="Consolas" panose="020B0609020204030204" pitchFamily="49" charset="0"/>
+                        </a:rPr>
+                        <a:t>int</a:t>
+                      </a:r>
+                      <a:r>
+                        <a:rPr lang="pt-BR" dirty="0">
+                          <a:solidFill>
+                            <a:srgbClr val="333333"/>
+                          </a:solidFill>
+                          <a:effectLst/>
+                          <a:latin typeface="Consolas" panose="020B0609020204030204" pitchFamily="49" charset="0"/>
+                        </a:rPr>
+                        <a:t> maxIter, </a:t>
+                      </a:r>
+                      <a:r>
+                        <a:rPr lang="pt-BR" dirty="0">
+                          <a:solidFill>
+                            <a:srgbClr val="A71D5D"/>
+                          </a:solidFill>
+                          <a:effectLst/>
+                          <a:latin typeface="Consolas" panose="020B0609020204030204" pitchFamily="49" charset="0"/>
+                        </a:rPr>
+                        <a:t>int</a:t>
+                      </a:r>
+                      <a:r>
+                        <a:rPr lang="pt-BR" dirty="0">
+                          <a:solidFill>
+                            <a:srgbClr val="333333"/>
+                          </a:solidFill>
+                          <a:effectLst/>
+                          <a:latin typeface="Consolas" panose="020B0609020204030204" pitchFamily="49" charset="0"/>
+                        </a:rPr>
+                        <a:t> </a:t>
+                      </a:r>
+                      <a:r>
+                        <a:rPr lang="pt-BR" dirty="0" smtClean="0">
+                          <a:solidFill>
+                            <a:srgbClr val="333333"/>
+                          </a:solidFill>
+                          <a:effectLst/>
+                          <a:latin typeface="Consolas" panose="020B0609020204030204" pitchFamily="49" charset="0"/>
+                        </a:rPr>
+                        <a:t>p)</a:t>
+                      </a:r>
+                      <a:endParaRPr lang="pt-BR" dirty="0">
+                        <a:solidFill>
+                          <a:srgbClr val="333333"/>
+                        </a:solidFill>
+                        <a:effectLst/>
+                        <a:latin typeface="Consolas" panose="020B0609020204030204" pitchFamily="49" charset="0"/>
+                      </a:endParaRPr>
+                    </a:p>
+                  </a:txBody>
+                  <a:tcPr marL="95250" marR="95250">
+                    <a:lnL>
+                      <a:noFill/>
+                    </a:lnL>
+                    <a:lnR>
+                      <a:noFill/>
+                    </a:lnR>
+                    <a:lnT>
+                      <a:noFill/>
+                    </a:lnT>
+                    <a:lnB>
+                      <a:noFill/>
+                    </a:lnB>
+                    <a:solidFill>
+                      <a:srgbClr val="FFFFFF"/>
+                    </a:solidFill>
+                  </a:tcPr>
+                </a:tc>
+                <a:extLst>
+                  <a:ext uri="{0D108BD9-81ED-4DB2-BD59-A6C34878D82A}">
+                    <a16:rowId xmlns:a16="http://schemas.microsoft.com/office/drawing/2014/main" val="1226812299"/>
+                  </a:ext>
+                </a:extLst>
+              </a:tr>
+            </a:tbl>
+          </a:graphicData>
+        </a:graphic>
+      </p:graphicFrame>
+      <p:sp>
+        <p:nvSpPr>
+          <p:cNvPr id="8" name="TextBox 7"/>
+          <p:cNvSpPr txBox="1"/>
+          <p:nvPr/>
         </p:nvSpPr>
         <p:spPr>
           <a:xfrm>
-            <a:off x="755576" y="2276872"/>
-            <a:ext cx="7848872" cy="3886200"/>
+            <a:off x="1115616" y="2406079"/>
+            <a:ext cx="4478790" cy="1348061"/>
           </a:xfrm>
+          <a:prstGeom prst="rect">
+            <a:avLst/>
+          </a:prstGeom>
+          <a:noFill/>
         </p:spPr>
         <p:txBody>
-          <a:bodyPr/>
+          <a:bodyPr wrap="none" rtlCol="0">
+            <a:spAutoFit/>
+          </a:bodyPr>
           <a:lstStyle/>
           <a:p>
-            <a:pPr marL="0" indent="0">
-              <a:buNone/>
+            <a:pPr marL="274320" lvl="0" indent="-274320">
+              <a:spcBef>
+                <a:spcPct val="20000"/>
+              </a:spcBef>
+              <a:buClr>
+                <a:srgbClr val="AD0101"/>
+              </a:buClr>
+              <a:buFont typeface="Arial" pitchFamily="34" charset="0"/>
+              <a:buChar char="•"/>
             </a:pPr>
-            <a:endParaRPr lang="pt-BR" dirty="0"/>
+            <a:r>
+              <a:rPr lang="pt-BR" sz="2400" dirty="0" smtClean="0">
+                <a:solidFill>
+                  <a:srgbClr val="303030"/>
+                </a:solidFill>
+              </a:rPr>
+              <a:t>CalcularRaiz</a:t>
+            </a:r>
+          </a:p>
+          <a:p>
+            <a:pPr marL="731520" lvl="1" indent="-274320">
+              <a:spcBef>
+                <a:spcPct val="20000"/>
+              </a:spcBef>
+              <a:buClr>
+                <a:srgbClr val="AD0101"/>
+              </a:buClr>
+              <a:buFont typeface="Arial" pitchFamily="34" charset="0"/>
+              <a:buChar char="•"/>
+            </a:pPr>
+            <a:r>
+              <a:rPr lang="pt-BR" sz="2400" dirty="0" smtClean="0">
+                <a:solidFill>
+                  <a:srgbClr val="303030"/>
+                </a:solidFill>
+              </a:rPr>
+              <a:t>Método de Newton-Raphson</a:t>
+            </a:r>
+          </a:p>
+          <a:p>
+            <a:pPr marL="731520" lvl="1" indent="-274320">
+              <a:spcBef>
+                <a:spcPct val="20000"/>
+              </a:spcBef>
+              <a:buClr>
+                <a:srgbClr val="AD0101"/>
+              </a:buClr>
+              <a:buFont typeface="Arial" pitchFamily="34" charset="0"/>
+              <a:buChar char="•"/>
+            </a:pPr>
+            <a:r>
+              <a:rPr lang="pt-BR" sz="2400" dirty="0" smtClean="0">
+                <a:solidFill>
+                  <a:srgbClr val="303030"/>
+                </a:solidFill>
+              </a:rPr>
+              <a:t>Método de Horner</a:t>
+            </a:r>
           </a:p>
         </p:txBody>
       </p:sp>
@@ -5204,8 +7220,455 @@
           </a:p>
         </p:txBody>
       </p:sp>
-      <mc:AlternateContent xmlns:mc="http://schemas.openxmlformats.org/markup-compatibility/2006">
-        <mc:Choice xmlns:a14="http://schemas.microsoft.com/office/drawing/2010/main" Requires="a14">
+      <p:graphicFrame>
+        <p:nvGraphicFramePr>
+          <p:cNvPr id="5" name="Content Placeholder 4"/>
+          <p:cNvGraphicFramePr>
+            <a:graphicFrameLocks noGrp="1"/>
+          </p:cNvGraphicFramePr>
+          <p:nvPr>
+            <p:ph idx="1"/>
+            <p:extLst>
+              <p:ext uri="{D42A27DB-BD31-4B8C-83A1-F6EECF244321}">
+                <p14:modId xmlns:p14="http://schemas.microsoft.com/office/powerpoint/2010/main" val="1440790591"/>
+              </p:ext>
+            </p:extLst>
+          </p:nvPr>
+        </p:nvGraphicFramePr>
+        <p:xfrm>
+          <a:off x="759586" y="4099371"/>
+          <a:ext cx="7543800" cy="1463040"/>
+        </p:xfrm>
+        <a:graphic>
+          <a:graphicData uri="http://schemas.openxmlformats.org/drawingml/2006/table">
+            <a:tbl>
+              <a:tblPr/>
+              <a:tblGrid>
+                <a:gridCol w="7543800">
+                  <a:extLst>
+                    <a:ext uri="{9D8B030D-6E8A-4147-A177-3AD203B41FA5}">
+                      <a16:colId xmlns:a16="http://schemas.microsoft.com/office/drawing/2014/main" val="2942055312"/>
+                    </a:ext>
+                  </a:extLst>
+                </a:gridCol>
+              </a:tblGrid>
+              <a:tr h="0">
+                <a:tc>
+                  <a:txBody>
+                    <a:bodyPr/>
+                    <a:lstStyle/>
+                    <a:p>
+                      <a:pPr fontAlgn="t"/>
+                      <a:r>
+                        <a:rPr lang="pt-BR" dirty="0">
+                          <a:solidFill>
+                            <a:srgbClr val="333333"/>
+                          </a:solidFill>
+                          <a:effectLst/>
+                          <a:latin typeface="Consolas" panose="020B0609020204030204" pitchFamily="49" charset="0"/>
+                        </a:rPr>
+                        <a:t/>
+                      </a:r>
+                      <a:br>
+                        <a:rPr lang="pt-BR" dirty="0">
+                          <a:solidFill>
+                            <a:srgbClr val="333333"/>
+                          </a:solidFill>
+                          <a:effectLst/>
+                          <a:latin typeface="Consolas" panose="020B0609020204030204" pitchFamily="49" charset="0"/>
+                        </a:rPr>
+                      </a:br>
+                      <a:r>
+                        <a:rPr lang="pt-BR" b="0" i="0" dirty="0" smtClean="0">
+                          <a:solidFill>
+                            <a:srgbClr val="333333"/>
+                          </a:solidFill>
+                          <a:effectLst/>
+                          <a:latin typeface="Consolas" panose="020B0609020204030204" pitchFamily="49" charset="0"/>
+                        </a:rPr>
+                        <a:t>std::vector&lt;std::vector&lt;</a:t>
+                      </a:r>
+                      <a:r>
+                        <a:rPr lang="pt-BR" b="0" i="0" dirty="0" smtClean="0">
+                          <a:solidFill>
+                            <a:srgbClr val="A71D5D"/>
+                          </a:solidFill>
+                          <a:effectLst/>
+                          <a:latin typeface="Consolas" panose="020B0609020204030204" pitchFamily="49" charset="0"/>
+                        </a:rPr>
+                        <a:t>double</a:t>
+                      </a:r>
+                      <a:r>
+                        <a:rPr lang="pt-BR" b="0" i="0" dirty="0" smtClean="0">
+                          <a:solidFill>
+                            <a:srgbClr val="333333"/>
+                          </a:solidFill>
+                          <a:effectLst/>
+                          <a:latin typeface="Consolas" panose="020B0609020204030204" pitchFamily="49" charset="0"/>
+                        </a:rPr>
+                        <a:t>&gt; &gt; </a:t>
+                      </a:r>
+                      <a:r>
+                        <a:rPr lang="pt-BR" b="0" i="0" dirty="0" smtClean="0">
+                          <a:solidFill>
+                            <a:srgbClr val="795DA3"/>
+                          </a:solidFill>
+                          <a:effectLst/>
+                          <a:latin typeface="Consolas" panose="020B0609020204030204" pitchFamily="49" charset="0"/>
+                        </a:rPr>
+                        <a:t>Newton::calcularRaizSec</a:t>
+                      </a:r>
+                      <a:r>
+                        <a:rPr lang="pt-BR" b="0" i="0" dirty="0" smtClean="0">
+                          <a:solidFill>
+                            <a:srgbClr val="333333"/>
+                          </a:solidFill>
+                          <a:effectLst/>
+                          <a:latin typeface="Consolas" panose="020B0609020204030204" pitchFamily="49" charset="0"/>
+                        </a:rPr>
+                        <a:t>(</a:t>
+                      </a:r>
+                      <a:r>
+                        <a:rPr lang="pt-BR" b="0" i="0" dirty="0" smtClean="0">
+                          <a:solidFill>
+                            <a:srgbClr val="A71D5D"/>
+                          </a:solidFill>
+                          <a:effectLst/>
+                          <a:latin typeface="Consolas" panose="020B0609020204030204" pitchFamily="49" charset="0"/>
+                        </a:rPr>
+                        <a:t>double</a:t>
+                      </a:r>
+                      <a:r>
+                        <a:rPr lang="pt-BR" b="0" i="0" dirty="0" smtClean="0">
+                          <a:solidFill>
+                            <a:srgbClr val="333333"/>
+                          </a:solidFill>
+                          <a:effectLst/>
+                          <a:latin typeface="Consolas" panose="020B0609020204030204" pitchFamily="49" charset="0"/>
+                        </a:rPr>
+                        <a:t> x0, </a:t>
+                      </a:r>
+                      <a:r>
+                        <a:rPr lang="pt-BR" b="0" i="0" dirty="0" smtClean="0">
+                          <a:solidFill>
+                            <a:srgbClr val="A71D5D"/>
+                          </a:solidFill>
+                          <a:effectLst/>
+                          <a:latin typeface="Consolas" panose="020B0609020204030204" pitchFamily="49" charset="0"/>
+                        </a:rPr>
+                        <a:t>double</a:t>
+                      </a:r>
+                      <a:r>
+                        <a:rPr lang="pt-BR" b="0" i="0" dirty="0" smtClean="0">
+                          <a:solidFill>
+                            <a:srgbClr val="333333"/>
+                          </a:solidFill>
+                          <a:effectLst/>
+                          <a:latin typeface="Consolas" panose="020B0609020204030204" pitchFamily="49" charset="0"/>
+                        </a:rPr>
+                        <a:t> x1, std::vector&lt;</a:t>
+                      </a:r>
+                      <a:r>
+                        <a:rPr lang="pt-BR" b="0" i="0" dirty="0" smtClean="0">
+                          <a:solidFill>
+                            <a:srgbClr val="A71D5D"/>
+                          </a:solidFill>
+                          <a:effectLst/>
+                          <a:latin typeface="Consolas" panose="020B0609020204030204" pitchFamily="49" charset="0"/>
+                        </a:rPr>
+                        <a:t>double</a:t>
+                      </a:r>
+                      <a:r>
+                        <a:rPr lang="pt-BR" b="0" i="0" dirty="0" smtClean="0">
+                          <a:solidFill>
+                            <a:srgbClr val="333333"/>
+                          </a:solidFill>
+                          <a:effectLst/>
+                          <a:latin typeface="Consolas" panose="020B0609020204030204" pitchFamily="49" charset="0"/>
+                        </a:rPr>
+                        <a:t>&gt; a, </a:t>
+                      </a:r>
+                      <a:r>
+                        <a:rPr lang="pt-BR" b="0" i="0" dirty="0" smtClean="0">
+                          <a:solidFill>
+                            <a:srgbClr val="A71D5D"/>
+                          </a:solidFill>
+                          <a:effectLst/>
+                          <a:latin typeface="Consolas" panose="020B0609020204030204" pitchFamily="49" charset="0"/>
+                        </a:rPr>
+                        <a:t>double</a:t>
+                      </a:r>
+                      <a:r>
+                        <a:rPr lang="pt-BR" b="0" i="0" dirty="0" smtClean="0">
+                          <a:solidFill>
+                            <a:srgbClr val="333333"/>
+                          </a:solidFill>
+                          <a:effectLst/>
+                          <a:latin typeface="Consolas" panose="020B0609020204030204" pitchFamily="49" charset="0"/>
+                        </a:rPr>
+                        <a:t> </a:t>
+                      </a:r>
+                      <a:r>
+                        <a:rPr lang="pt-BR" b="0" i="0" dirty="0" smtClean="0">
+                          <a:solidFill>
+                            <a:srgbClr val="0086B3"/>
+                          </a:solidFill>
+                          <a:effectLst/>
+                          <a:latin typeface="Consolas" panose="020B0609020204030204" pitchFamily="49" charset="0"/>
+                        </a:rPr>
+                        <a:t>e1</a:t>
+                      </a:r>
+                      <a:r>
+                        <a:rPr lang="pt-BR" b="0" i="0" dirty="0" smtClean="0">
+                          <a:solidFill>
+                            <a:srgbClr val="333333"/>
+                          </a:solidFill>
+                          <a:effectLst/>
+                          <a:latin typeface="Consolas" panose="020B0609020204030204" pitchFamily="49" charset="0"/>
+                        </a:rPr>
+                        <a:t>, </a:t>
+                      </a:r>
+                      <a:r>
+                        <a:rPr lang="pt-BR" b="0" i="0" dirty="0" smtClean="0">
+                          <a:solidFill>
+                            <a:srgbClr val="A71D5D"/>
+                          </a:solidFill>
+                          <a:effectLst/>
+                          <a:latin typeface="Consolas" panose="020B0609020204030204" pitchFamily="49" charset="0"/>
+                        </a:rPr>
+                        <a:t>double</a:t>
+                      </a:r>
+                      <a:r>
+                        <a:rPr lang="pt-BR" b="0" i="0" dirty="0" smtClean="0">
+                          <a:solidFill>
+                            <a:srgbClr val="333333"/>
+                          </a:solidFill>
+                          <a:effectLst/>
+                          <a:latin typeface="Consolas" panose="020B0609020204030204" pitchFamily="49" charset="0"/>
+                        </a:rPr>
+                        <a:t> </a:t>
+                      </a:r>
+                      <a:r>
+                        <a:rPr lang="pt-BR" b="0" i="0" dirty="0" smtClean="0">
+                          <a:solidFill>
+                            <a:srgbClr val="0086B3"/>
+                          </a:solidFill>
+                          <a:effectLst/>
+                          <a:latin typeface="Consolas" panose="020B0609020204030204" pitchFamily="49" charset="0"/>
+                        </a:rPr>
+                        <a:t>e2</a:t>
+                      </a:r>
+                      <a:r>
+                        <a:rPr lang="pt-BR" b="0" i="0" dirty="0" smtClean="0">
+                          <a:solidFill>
+                            <a:srgbClr val="333333"/>
+                          </a:solidFill>
+                          <a:effectLst/>
+                          <a:latin typeface="Consolas" panose="020B0609020204030204" pitchFamily="49" charset="0"/>
+                        </a:rPr>
+                        <a:t>, </a:t>
+                      </a:r>
+                      <a:r>
+                        <a:rPr lang="pt-BR" b="0" i="0" dirty="0" smtClean="0">
+                          <a:solidFill>
+                            <a:srgbClr val="A71D5D"/>
+                          </a:solidFill>
+                          <a:effectLst/>
+                          <a:latin typeface="Consolas" panose="020B0609020204030204" pitchFamily="49" charset="0"/>
+                        </a:rPr>
+                        <a:t>int</a:t>
+                      </a:r>
+                      <a:r>
+                        <a:rPr lang="pt-BR" b="0" i="0" dirty="0" smtClean="0">
+                          <a:solidFill>
+                            <a:srgbClr val="333333"/>
+                          </a:solidFill>
+                          <a:effectLst/>
+                          <a:latin typeface="Consolas" panose="020B0609020204030204" pitchFamily="49" charset="0"/>
+                        </a:rPr>
+                        <a:t> maxIter, </a:t>
+                      </a:r>
+                      <a:r>
+                        <a:rPr lang="pt-BR" b="0" i="0" dirty="0" smtClean="0">
+                          <a:solidFill>
+                            <a:srgbClr val="A71D5D"/>
+                          </a:solidFill>
+                          <a:effectLst/>
+                          <a:latin typeface="Consolas" panose="020B0609020204030204" pitchFamily="49" charset="0"/>
+                        </a:rPr>
+                        <a:t>int</a:t>
+                      </a:r>
+                      <a:r>
+                        <a:rPr lang="pt-BR" b="0" i="0" dirty="0" smtClean="0">
+                          <a:solidFill>
+                            <a:srgbClr val="333333"/>
+                          </a:solidFill>
+                          <a:effectLst/>
+                          <a:latin typeface="Consolas" panose="020B0609020204030204" pitchFamily="49" charset="0"/>
+                        </a:rPr>
+                        <a:t> p)</a:t>
+                      </a:r>
+                      <a:endParaRPr lang="pt-BR" dirty="0">
+                        <a:solidFill>
+                          <a:srgbClr val="333333"/>
+                        </a:solidFill>
+                        <a:effectLst/>
+                        <a:latin typeface="Consolas" panose="020B0609020204030204" pitchFamily="49" charset="0"/>
+                      </a:endParaRPr>
+                    </a:p>
+                  </a:txBody>
+                  <a:tcPr marL="95250" marR="95250">
+                    <a:lnL>
+                      <a:noFill/>
+                    </a:lnL>
+                    <a:lnR>
+                      <a:noFill/>
+                    </a:lnR>
+                    <a:lnT>
+                      <a:noFill/>
+                    </a:lnT>
+                    <a:lnB>
+                      <a:noFill/>
+                    </a:lnB>
+                    <a:solidFill>
+                      <a:srgbClr val="FFFFFF"/>
+                    </a:solidFill>
+                  </a:tcPr>
+                </a:tc>
+                <a:extLst>
+                  <a:ext uri="{0D108BD9-81ED-4DB2-BD59-A6C34878D82A}">
+                    <a16:rowId xmlns:a16="http://schemas.microsoft.com/office/drawing/2014/main" val="1226812299"/>
+                  </a:ext>
+                </a:extLst>
+              </a:tr>
+            </a:tbl>
+          </a:graphicData>
+        </a:graphic>
+      </p:graphicFrame>
+      <p:sp>
+        <p:nvSpPr>
+          <p:cNvPr id="8" name="TextBox 7"/>
+          <p:cNvSpPr txBox="1"/>
+          <p:nvPr/>
+        </p:nvSpPr>
+        <p:spPr>
+          <a:xfrm>
+            <a:off x="1115616" y="2406079"/>
+            <a:ext cx="3279744" cy="904863"/>
+          </a:xfrm>
+          <a:prstGeom prst="rect">
+            <a:avLst/>
+          </a:prstGeom>
+          <a:noFill/>
+        </p:spPr>
+        <p:txBody>
+          <a:bodyPr wrap="none" rtlCol="0">
+            <a:spAutoFit/>
+          </a:bodyPr>
+          <a:lstStyle/>
+          <a:p>
+            <a:pPr marL="274320" lvl="0" indent="-274320">
+              <a:spcBef>
+                <a:spcPct val="20000"/>
+              </a:spcBef>
+              <a:buClr>
+                <a:srgbClr val="AD0101"/>
+              </a:buClr>
+              <a:buFont typeface="Arial" pitchFamily="34" charset="0"/>
+              <a:buChar char="•"/>
+            </a:pPr>
+            <a:r>
+              <a:rPr lang="pt-BR" sz="2400" dirty="0" smtClean="0">
+                <a:solidFill>
+                  <a:srgbClr val="303030"/>
+                </a:solidFill>
+              </a:rPr>
+              <a:t>CalcularRaizSec</a:t>
+            </a:r>
+          </a:p>
+          <a:p>
+            <a:pPr marL="731520" lvl="1" indent="-274320">
+              <a:spcBef>
+                <a:spcPct val="20000"/>
+              </a:spcBef>
+              <a:buClr>
+                <a:srgbClr val="AD0101"/>
+              </a:buClr>
+              <a:buFont typeface="Arial" pitchFamily="34" charset="0"/>
+              <a:buChar char="•"/>
+            </a:pPr>
+            <a:r>
+              <a:rPr lang="pt-BR" sz="2400" dirty="0" smtClean="0">
+                <a:solidFill>
+                  <a:srgbClr val="303030"/>
+                </a:solidFill>
+              </a:rPr>
+              <a:t>Método da Secante</a:t>
+            </a:r>
+          </a:p>
+        </p:txBody>
+      </p:sp>
+    </p:spTree>
+    <p:extLst>
+      <p:ext uri="{BB962C8B-B14F-4D97-AF65-F5344CB8AC3E}">
+        <p14:creationId xmlns:p14="http://schemas.microsoft.com/office/powerpoint/2010/main" val="2088639163"/>
+      </p:ext>
+    </p:extLst>
+  </p:cSld>
+  <p:clrMapOvr>
+    <a:masterClrMapping/>
+  </p:clrMapOvr>
+</p:sld>
+</file>
+
+<file path=ppt/slides/slide8.xml><?xml version="1.0" encoding="utf-8"?>
+<p:sld xmlns:a="http://schemas.openxmlformats.org/drawingml/2006/main" xmlns:r="http://schemas.openxmlformats.org/officeDocument/2006/relationships" xmlns:p="http://schemas.openxmlformats.org/presentationml/2006/main">
+  <p:cSld>
+    <p:spTree>
+      <p:nvGrpSpPr>
+        <p:cNvPr id="1" name=""/>
+        <p:cNvGrpSpPr/>
+        <p:nvPr/>
+      </p:nvGrpSpPr>
+      <p:grpSpPr>
+        <a:xfrm>
+          <a:off x="0" y="0"/>
+          <a:ext cx="0" cy="0"/>
+          <a:chOff x="0" y="0"/>
+          <a:chExt cx="0" cy="0"/>
+        </a:xfrm>
+      </p:grpSpPr>
+      <p:sp>
+        <p:nvSpPr>
+          <p:cNvPr id="2" name="Título 1"/>
+          <p:cNvSpPr>
+            <a:spLocks noGrp="1"/>
+          </p:cNvSpPr>
+          <p:nvPr>
+            <p:ph type="title"/>
+          </p:nvPr>
+        </p:nvSpPr>
+        <p:spPr>
+          <a:xfrm>
+            <a:off x="755576" y="692696"/>
+            <a:ext cx="6781800" cy="1368152"/>
+          </a:xfrm>
+        </p:spPr>
+        <p:txBody>
+          <a:bodyPr/>
+          <a:lstStyle/>
+          <a:p>
+            <a:r>
+              <a:rPr lang="pt-BR" dirty="0">
+                <a:latin typeface="Baskerville Old Face" panose="02020602080505020303" pitchFamily="18" charset="0"/>
+              </a:rPr>
+              <a:t>METODOLOGIA</a:t>
+            </a:r>
+          </a:p>
+        </p:txBody>
+      </p:sp>
+      <mc:AlternateContent xmlns:mc="http://schemas.openxmlformats.org/markup-compatibility/2006" xmlns:a14="http://schemas.microsoft.com/office/drawing/2010/main">
+        <mc:Choice Requires="a14">
           <p:sp>
             <p:nvSpPr>
               <p:cNvPr id="3" name="Espaço Reservado para Conteúdo 2"/>
@@ -5413,7 +7876,7 @@
             </p:txBody>
           </p:sp>
         </mc:Choice>
-        <mc:Fallback>
+        <mc:Fallback xmlns="">
           <p:sp>
             <p:nvSpPr>
               <p:cNvPr id="3" name="Espaço Reservado para Conteúdo 2"/>
@@ -5464,146 +7927,6 @@
 </p:sld>
 </file>
 
-<file path=ppt/slides/slide8.xml><?xml version="1.0" encoding="utf-8"?>
-<p:sld xmlns:a="http://schemas.openxmlformats.org/drawingml/2006/main" xmlns:r="http://schemas.openxmlformats.org/officeDocument/2006/relationships" xmlns:p="http://schemas.openxmlformats.org/presentationml/2006/main">
-  <p:cSld>
-    <p:spTree>
-      <p:nvGrpSpPr>
-        <p:cNvPr id="1" name=""/>
-        <p:cNvGrpSpPr/>
-        <p:nvPr/>
-      </p:nvGrpSpPr>
-      <p:grpSpPr>
-        <a:xfrm>
-          <a:off x="0" y="0"/>
-          <a:ext cx="0" cy="0"/>
-          <a:chOff x="0" y="0"/>
-          <a:chExt cx="0" cy="0"/>
-        </a:xfrm>
-      </p:grpSpPr>
-      <p:sp>
-        <p:nvSpPr>
-          <p:cNvPr id="2" name="Título 1"/>
-          <p:cNvSpPr>
-            <a:spLocks noGrp="1"/>
-          </p:cNvSpPr>
-          <p:nvPr>
-            <p:ph type="title"/>
-          </p:nvPr>
-        </p:nvSpPr>
-        <p:spPr>
-          <a:xfrm>
-            <a:off x="755576" y="692696"/>
-            <a:ext cx="6781800" cy="1368152"/>
-          </a:xfrm>
-        </p:spPr>
-        <p:txBody>
-          <a:bodyPr/>
-          <a:lstStyle/>
-          <a:p>
-            <a:r>
-              <a:rPr lang="pt-BR" dirty="0">
-                <a:latin typeface="Baskerville Old Face" panose="02020602080505020303" pitchFamily="18" charset="0"/>
-              </a:rPr>
-              <a:t>METODOLOGIA</a:t>
-            </a:r>
-          </a:p>
-        </p:txBody>
-      </p:sp>
-      <p:sp>
-        <p:nvSpPr>
-          <p:cNvPr id="3" name="Espaço Reservado para Conteúdo 2"/>
-          <p:cNvSpPr>
-            <a:spLocks noGrp="1"/>
-          </p:cNvSpPr>
-          <p:nvPr>
-            <p:ph idx="1"/>
-          </p:nvPr>
-        </p:nvSpPr>
-        <p:spPr>
-          <a:xfrm>
-            <a:off x="755576" y="2276872"/>
-            <a:ext cx="7776864" cy="3886200"/>
-          </a:xfrm>
-        </p:spPr>
-        <p:txBody>
-          <a:bodyPr>
-            <a:normAutofit lnSpcReduction="10000"/>
-          </a:bodyPr>
-          <a:lstStyle/>
-          <a:p>
-            <a:r>
-              <a:rPr lang="pt-BR" dirty="0"/>
-              <a:t>Primeiro,  usamos o Teorema do círculo 2 para achar o intervalo de todas as raízes reais da função.</a:t>
-            </a:r>
-          </a:p>
-          <a:p>
-            <a:endParaRPr lang="pt-BR" dirty="0"/>
-          </a:p>
-          <a:p>
-            <a:r>
-              <a:rPr lang="pt-BR" dirty="0"/>
-              <a:t>Depois, buscamos por intervalos com uma única raiz usando o teorema de </a:t>
-            </a:r>
-            <a:r>
-              <a:rPr lang="pt-BR" dirty="0" err="1"/>
-              <a:t>Sturn</a:t>
-            </a:r>
-            <a:r>
-              <a:rPr lang="pt-BR" dirty="0"/>
-              <a:t>.</a:t>
-            </a:r>
-          </a:p>
-          <a:p>
-            <a:endParaRPr lang="pt-BR" dirty="0"/>
-          </a:p>
-          <a:p>
-            <a:r>
-              <a:rPr lang="pt-BR" dirty="0"/>
-              <a:t>A função retorna uma sequencia de números onde cada intervalo entre estes números reside uma única </a:t>
-            </a:r>
-            <a:r>
-              <a:rPr lang="pt-BR" u="sng" dirty="0"/>
-              <a:t>raiz real,</a:t>
-            </a:r>
-            <a:r>
-              <a:rPr lang="pt-BR" dirty="0"/>
-              <a:t> ou um único valor indicando que não existem raízes reais para </a:t>
-            </a:r>
-            <a:r>
-              <a:rPr lang="pt-BR" dirty="0" err="1"/>
-              <a:t>P</a:t>
-            </a:r>
-            <a:r>
-              <a:rPr lang="pt-BR" baseline="-25000" dirty="0" err="1"/>
-              <a:t>x</a:t>
-            </a:r>
-            <a:r>
-              <a:rPr lang="pt-BR" dirty="0"/>
-              <a:t>.</a:t>
-            </a:r>
-          </a:p>
-          <a:p>
-            <a:pPr marL="0" indent="0">
-              <a:buNone/>
-            </a:pPr>
-            <a:endParaRPr lang="pt-BR" dirty="0"/>
-          </a:p>
-        </p:txBody>
-      </p:sp>
-    </p:spTree>
-    <p:extLst>
-      <p:ext uri="{BB962C8B-B14F-4D97-AF65-F5344CB8AC3E}">
-        <p14:creationId xmlns:p14="http://schemas.microsoft.com/office/powerpoint/2010/main" val="2794506273"/>
-      </p:ext>
-    </p:extLst>
-  </p:cSld>
-  <p:clrMapOvr>
-    <a:masterClrMapping/>
-  </p:clrMapOvr>
-</p:sld>
-</file>
-
 <file path=ppt/slides/slide9.xml><?xml version="1.0" encoding="utf-8"?>
 <p:sld xmlns:a="http://schemas.openxmlformats.org/drawingml/2006/main" xmlns:r="http://schemas.openxmlformats.org/officeDocument/2006/relationships" xmlns:p="http://schemas.openxmlformats.org/presentationml/2006/main">
   <p:cSld>
@@ -5633,22 +7956,19 @@
         </p:nvSpPr>
         <p:spPr>
           <a:xfrm>
-            <a:off x="992560" y="364866"/>
-            <a:ext cx="6781800" cy="1600200"/>
+            <a:off x="755576" y="692696"/>
+            <a:ext cx="6781800" cy="1368152"/>
           </a:xfrm>
         </p:spPr>
         <p:txBody>
-          <a:bodyPr>
-            <a:normAutofit fontScale="90000"/>
-          </a:bodyPr>
+          <a:bodyPr/>
           <a:lstStyle/>
           <a:p>
-            <a:pPr algn="ctr"/>
             <a:r>
               <a:rPr lang="pt-BR" dirty="0">
-                <a:latin typeface="Baskerville Old Face" panose="02020602080505020303"/>
+                <a:latin typeface="Baskerville Old Face" panose="02020602080505020303" pitchFamily="18" charset="0"/>
               </a:rPr>
-              <a:t>Funções usadas no refinamento</a:t>
+              <a:t>METODOLOGIA</a:t>
             </a:r>
           </a:p>
         </p:txBody>
@@ -5665,69 +7985,79 @@
         </p:nvSpPr>
         <p:spPr>
           <a:xfrm>
-            <a:off x="611560" y="1932856"/>
-            <a:ext cx="7543800" cy="3886200"/>
+            <a:off x="755576" y="2276872"/>
+            <a:ext cx="7776864" cy="3886200"/>
           </a:xfrm>
         </p:spPr>
         <p:txBody>
-          <a:bodyPr/>
+          <a:bodyPr>
+            <a:normAutofit lnSpcReduction="10000"/>
+          </a:bodyPr>
           <a:lstStyle/>
           <a:p>
             <a:r>
               <a:rPr lang="pt-BR" dirty="0"/>
-              <a:t>1: </a:t>
+              <a:t>Primeiro,  usamos o Teorema do círculo 2 para achar o intervalo de todas as raízes reais da função.</a:t>
+            </a:r>
+          </a:p>
+          <a:p>
+            <a:endParaRPr lang="pt-BR" dirty="0"/>
+          </a:p>
+          <a:p>
+            <a:r>
+              <a:rPr lang="pt-BR" dirty="0"/>
+              <a:t>Depois, buscamos por intervalos com uma única raiz usando o teorema de </a:t>
             </a:r>
             <a:r>
               <a:rPr lang="pt-BR" dirty="0" err="1"/>
-              <a:t>int</a:t>
+              <a:t>Sturn</a:t>
             </a:r>
             <a:r>
               <a:rPr lang="pt-BR" dirty="0"/>
-              <a:t> Círculo( polinômio P )</a:t>
-            </a:r>
+              <a:t>.</a:t>
+            </a:r>
+          </a:p>
+          <a:p>
+            <a:endParaRPr lang="pt-BR" dirty="0"/>
           </a:p>
           <a:p>
             <a:r>
               <a:rPr lang="pt-BR" dirty="0"/>
-              <a:t>2: polinômio </a:t>
+              <a:t>A função retorna uma sequencia de números onde cada intervalo entre estes números reside uma única </a:t>
+            </a:r>
+            <a:r>
+              <a:rPr lang="pt-BR" u="sng" dirty="0"/>
+              <a:t>raiz real,</a:t>
+            </a:r>
+            <a:r>
+              <a:rPr lang="pt-BR" dirty="0"/>
+              <a:t> ou um único valor indicando que não existem raízes reais para </a:t>
             </a:r>
             <a:r>
               <a:rPr lang="pt-BR" dirty="0" err="1"/>
-              <a:t>divPolinomio</a:t>
+              <a:t>P</a:t>
+            </a:r>
+            <a:r>
+              <a:rPr lang="pt-BR" baseline="-25000" dirty="0" err="1"/>
+              <a:t>x</a:t>
             </a:r>
             <a:r>
               <a:rPr lang="pt-BR" dirty="0"/>
-              <a:t> (polinômio p1, polinômio p2)</a:t>
-            </a:r>
-          </a:p>
-          <a:p>
-            <a:r>
-              <a:rPr lang="pt-BR" dirty="0"/>
-              <a:t>3: intervalos </a:t>
-            </a:r>
-            <a:r>
-              <a:rPr lang="pt-BR" dirty="0" err="1"/>
-              <a:t>nZeros</a:t>
-            </a:r>
-            <a:r>
-              <a:rPr lang="pt-BR" dirty="0"/>
-              <a:t> (</a:t>
-            </a:r>
-            <a:r>
-              <a:rPr lang="pt-BR" dirty="0" err="1"/>
-              <a:t>Polinomio</a:t>
-            </a:r>
-            <a:r>
-              <a:rPr lang="pt-BR" dirty="0"/>
-              <a:t> P, intervalo I,  índice i)</a:t>
-            </a:r>
+              <a:t>.</a:t>
+            </a:r>
+          </a:p>
+          <a:p>
+            <a:pPr marL="0" indent="0">
+              <a:buNone/>
+            </a:pPr>
+            <a:endParaRPr lang="pt-BR" dirty="0"/>
           </a:p>
         </p:txBody>
       </p:sp>
     </p:spTree>
     <p:extLst>
       <p:ext uri="{BB962C8B-B14F-4D97-AF65-F5344CB8AC3E}">
-        <p14:creationId xmlns:p14="http://schemas.microsoft.com/office/powerpoint/2010/main" val="441614925"/>
+        <p14:creationId xmlns:p14="http://schemas.microsoft.com/office/powerpoint/2010/main" val="2794506273"/>
       </p:ext>
     </p:extLst>
   </p:cSld>

</xml_diff>